<commit_message>
Initial work to update the facilitation slides powerpoint download
</commit_message>
<xml_diff>
--- a/public/GOFOX_facilitation_slides.pptx
+++ b/public/GOFOX_facilitation_slides.pptx
@@ -219,7 +219,7 @@
           <a:p>
             <a:fld id="{42765357-8744-48A9-ABAF-220D96406E43}" type="datetimeFigureOut">
               <a:rPr lang="en-GB" smtClean="0"/>
-              <a:t>11/07/2019</a:t>
+              <a:t>16/09/2019</a:t>
             </a:fld>
             <a:endParaRPr lang="en-GB"/>
           </a:p>
@@ -283,35 +283,35 @@
           <a:p>
             <a:pPr lvl="0"/>
             <a:r>
-              <a:rPr lang="en-US" smtClean="0"/>
+              <a:rPr lang="en-US"/>
               <a:t>Click to edit Master text styles</a:t>
             </a:r>
           </a:p>
           <a:p>
             <a:pPr lvl="1"/>
             <a:r>
-              <a:rPr lang="en-US" smtClean="0"/>
+              <a:rPr lang="en-US"/>
               <a:t>Second level</a:t>
             </a:r>
           </a:p>
           <a:p>
             <a:pPr lvl="2"/>
             <a:r>
-              <a:rPr lang="en-US" smtClean="0"/>
+              <a:rPr lang="en-US"/>
               <a:t>Third level</a:t>
             </a:r>
           </a:p>
           <a:p>
             <a:pPr lvl="3"/>
             <a:r>
-              <a:rPr lang="en-US" smtClean="0"/>
+              <a:rPr lang="en-US"/>
               <a:t>Fourth level</a:t>
             </a:r>
           </a:p>
           <a:p>
             <a:pPr lvl="4"/>
             <a:r>
-              <a:rPr lang="en-US" smtClean="0"/>
+              <a:rPr lang="en-US"/>
               <a:t>Fifth level</a:t>
             </a:r>
             <a:endParaRPr lang="en-GB"/>
@@ -378,7 +378,7 @@
           <a:p>
             <a:fld id="{19BBBA81-0641-4DAC-945B-BCF048C8C021}" type="slidenum">
               <a:rPr lang="en-GB" smtClean="0"/>
-              <a:t>‹#›</a:t>
+              <a:t>‹Nº›</a:t>
             </a:fld>
             <a:endParaRPr lang="en-GB"/>
           </a:p>
@@ -535,7 +535,7 @@
           <a:bodyPr/>
           <a:lstStyle/>
           <a:p>
-            <a:endParaRPr lang="en-GB" altLang="en-US" dirty="0" smtClean="0"/>
+            <a:endParaRPr lang="en-GB" altLang="en-US" dirty="0"/>
           </a:p>
         </p:txBody>
       </p:sp>
@@ -658,7 +658,7 @@
               <a:pPr/>
               <a:t>19</a:t>
             </a:fld>
-            <a:endParaRPr lang="en-GB" altLang="en-US" dirty="0" smtClean="0"/>
+            <a:endParaRPr lang="en-GB" altLang="en-US" dirty="0"/>
           </a:p>
         </p:txBody>
       </p:sp>
@@ -723,7 +723,7 @@
           <a:bodyPr/>
           <a:lstStyle/>
           <a:p>
-            <a:endParaRPr lang="en-GB" altLang="en-US" dirty="0" smtClean="0"/>
+            <a:endParaRPr lang="en-GB" altLang="en-US" dirty="0"/>
           </a:p>
         </p:txBody>
       </p:sp>
@@ -846,7 +846,7 @@
               <a:pPr/>
               <a:t>20</a:t>
             </a:fld>
-            <a:endParaRPr lang="en-GB" altLang="en-US" dirty="0" smtClean="0"/>
+            <a:endParaRPr lang="en-GB" altLang="en-US" dirty="0"/>
           </a:p>
         </p:txBody>
       </p:sp>
@@ -911,7 +911,7 @@
           <a:bodyPr/>
           <a:lstStyle/>
           <a:p>
-            <a:endParaRPr lang="en-GB" altLang="en-US" dirty="0" smtClean="0"/>
+            <a:endParaRPr lang="en-GB" altLang="en-US" dirty="0"/>
           </a:p>
         </p:txBody>
       </p:sp>
@@ -1034,7 +1034,7 @@
               <a:pPr/>
               <a:t>21</a:t>
             </a:fld>
-            <a:endParaRPr lang="en-GB" altLang="en-US" dirty="0" smtClean="0"/>
+            <a:endParaRPr lang="en-GB" altLang="en-US" dirty="0"/>
           </a:p>
         </p:txBody>
       </p:sp>
@@ -1099,7 +1099,7 @@
           <a:bodyPr/>
           <a:lstStyle/>
           <a:p>
-            <a:endParaRPr lang="en-GB" altLang="en-US" dirty="0" smtClean="0"/>
+            <a:endParaRPr lang="en-GB" altLang="en-US" dirty="0"/>
           </a:p>
         </p:txBody>
       </p:sp>
@@ -1222,7 +1222,7 @@
               <a:pPr/>
               <a:t>23</a:t>
             </a:fld>
-            <a:endParaRPr lang="en-GB" altLang="en-US" dirty="0" smtClean="0"/>
+            <a:endParaRPr lang="en-GB" altLang="en-US" dirty="0"/>
           </a:p>
         </p:txBody>
       </p:sp>
@@ -1281,7 +1281,7 @@
           </a:lstStyle>
           <a:p>
             <a:r>
-              <a:rPr lang="en-US" smtClean="0"/>
+              <a:rPr lang="en-US"/>
               <a:t>Click to edit Master title style</a:t>
             </a:r>
             <a:endParaRPr lang="en-GB"/>
@@ -1346,7 +1346,7 @@
           </a:lstStyle>
           <a:p>
             <a:r>
-              <a:rPr lang="en-US" smtClean="0"/>
+              <a:rPr lang="en-US"/>
               <a:t>Click to edit Master subtitle style</a:t>
             </a:r>
             <a:endParaRPr lang="en-GB"/>
@@ -1370,7 +1370,7 @@
           <a:p>
             <a:fld id="{A7E1A4B6-3731-4EDA-AC55-7C43CB84885A}" type="datetimeFigureOut">
               <a:rPr lang="en-GB" smtClean="0"/>
-              <a:t>11/07/2019</a:t>
+              <a:t>16/09/2019</a:t>
             </a:fld>
             <a:endParaRPr lang="en-GB"/>
           </a:p>
@@ -1412,7 +1412,7 @@
           <a:p>
             <a:fld id="{76576B4B-38A6-44EB-8306-DA5BB936D590}" type="slidenum">
               <a:rPr lang="en-GB" smtClean="0"/>
-              <a:t>‹#›</a:t>
+              <a:t>‹Nº›</a:t>
             </a:fld>
             <a:endParaRPr lang="en-GB"/>
           </a:p>
@@ -1464,7 +1464,7 @@
           <a:lstStyle/>
           <a:p>
             <a:r>
-              <a:rPr lang="en-US" smtClean="0"/>
+              <a:rPr lang="en-US"/>
               <a:t>Click to edit Master title style</a:t>
             </a:r>
             <a:endParaRPr lang="en-GB"/>
@@ -1488,35 +1488,35 @@
           <a:p>
             <a:pPr lvl="0"/>
             <a:r>
-              <a:rPr lang="en-US" smtClean="0"/>
+              <a:rPr lang="en-US"/>
               <a:t>Click to edit Master text styles</a:t>
             </a:r>
           </a:p>
           <a:p>
             <a:pPr lvl="1"/>
             <a:r>
-              <a:rPr lang="en-US" smtClean="0"/>
+              <a:rPr lang="en-US"/>
               <a:t>Second level</a:t>
             </a:r>
           </a:p>
           <a:p>
             <a:pPr lvl="2"/>
             <a:r>
-              <a:rPr lang="en-US" smtClean="0"/>
+              <a:rPr lang="en-US"/>
               <a:t>Third level</a:t>
             </a:r>
           </a:p>
           <a:p>
             <a:pPr lvl="3"/>
             <a:r>
-              <a:rPr lang="en-US" smtClean="0"/>
+              <a:rPr lang="en-US"/>
               <a:t>Fourth level</a:t>
             </a:r>
           </a:p>
           <a:p>
             <a:pPr lvl="4"/>
             <a:r>
-              <a:rPr lang="en-US" smtClean="0"/>
+              <a:rPr lang="en-US"/>
               <a:t>Fifth level</a:t>
             </a:r>
             <a:endParaRPr lang="en-GB"/>
@@ -1540,7 +1540,7 @@
           <a:p>
             <a:fld id="{A7E1A4B6-3731-4EDA-AC55-7C43CB84885A}" type="datetimeFigureOut">
               <a:rPr lang="en-GB" smtClean="0"/>
-              <a:t>11/07/2019</a:t>
+              <a:t>16/09/2019</a:t>
             </a:fld>
             <a:endParaRPr lang="en-GB"/>
           </a:p>
@@ -1582,7 +1582,7 @@
           <a:p>
             <a:fld id="{76576B4B-38A6-44EB-8306-DA5BB936D590}" type="slidenum">
               <a:rPr lang="en-GB" smtClean="0"/>
-              <a:t>‹#›</a:t>
+              <a:t>‹Nº›</a:t>
             </a:fld>
             <a:endParaRPr lang="en-GB"/>
           </a:p>
@@ -1639,7 +1639,7 @@
           <a:lstStyle/>
           <a:p>
             <a:r>
-              <a:rPr lang="en-US" smtClean="0"/>
+              <a:rPr lang="en-US"/>
               <a:t>Click to edit Master title style</a:t>
             </a:r>
             <a:endParaRPr lang="en-GB"/>
@@ -1668,35 +1668,35 @@
           <a:p>
             <a:pPr lvl="0"/>
             <a:r>
-              <a:rPr lang="en-US" smtClean="0"/>
+              <a:rPr lang="en-US"/>
               <a:t>Click to edit Master text styles</a:t>
             </a:r>
           </a:p>
           <a:p>
             <a:pPr lvl="1"/>
             <a:r>
-              <a:rPr lang="en-US" smtClean="0"/>
+              <a:rPr lang="en-US"/>
               <a:t>Second level</a:t>
             </a:r>
           </a:p>
           <a:p>
             <a:pPr lvl="2"/>
             <a:r>
-              <a:rPr lang="en-US" smtClean="0"/>
+              <a:rPr lang="en-US"/>
               <a:t>Third level</a:t>
             </a:r>
           </a:p>
           <a:p>
             <a:pPr lvl="3"/>
             <a:r>
-              <a:rPr lang="en-US" smtClean="0"/>
+              <a:rPr lang="en-US"/>
               <a:t>Fourth level</a:t>
             </a:r>
           </a:p>
           <a:p>
             <a:pPr lvl="4"/>
             <a:r>
-              <a:rPr lang="en-US" smtClean="0"/>
+              <a:rPr lang="en-US"/>
               <a:t>Fifth level</a:t>
             </a:r>
             <a:endParaRPr lang="en-GB"/>
@@ -1720,7 +1720,7 @@
           <a:p>
             <a:fld id="{A7E1A4B6-3731-4EDA-AC55-7C43CB84885A}" type="datetimeFigureOut">
               <a:rPr lang="en-GB" smtClean="0"/>
-              <a:t>11/07/2019</a:t>
+              <a:t>16/09/2019</a:t>
             </a:fld>
             <a:endParaRPr lang="en-GB"/>
           </a:p>
@@ -1762,7 +1762,7 @@
           <a:p>
             <a:fld id="{76576B4B-38A6-44EB-8306-DA5BB936D590}" type="slidenum">
               <a:rPr lang="en-GB" smtClean="0"/>
-              <a:t>‹#›</a:t>
+              <a:t>‹Nº›</a:t>
             </a:fld>
             <a:endParaRPr lang="en-GB"/>
           </a:p>
@@ -1814,7 +1814,7 @@
           <a:lstStyle/>
           <a:p>
             <a:r>
-              <a:rPr lang="en-US" smtClean="0"/>
+              <a:rPr lang="en-US"/>
               <a:t>Click to edit Master title style</a:t>
             </a:r>
             <a:endParaRPr lang="en-GB"/>
@@ -1838,35 +1838,35 @@
           <a:p>
             <a:pPr lvl="0"/>
             <a:r>
-              <a:rPr lang="en-US" smtClean="0"/>
+              <a:rPr lang="en-US"/>
               <a:t>Click to edit Master text styles</a:t>
             </a:r>
           </a:p>
           <a:p>
             <a:pPr lvl="1"/>
             <a:r>
-              <a:rPr lang="en-US" smtClean="0"/>
+              <a:rPr lang="en-US"/>
               <a:t>Second level</a:t>
             </a:r>
           </a:p>
           <a:p>
             <a:pPr lvl="2"/>
             <a:r>
-              <a:rPr lang="en-US" smtClean="0"/>
+              <a:rPr lang="en-US"/>
               <a:t>Third level</a:t>
             </a:r>
           </a:p>
           <a:p>
             <a:pPr lvl="3"/>
             <a:r>
-              <a:rPr lang="en-US" smtClean="0"/>
+              <a:rPr lang="en-US"/>
               <a:t>Fourth level</a:t>
             </a:r>
           </a:p>
           <a:p>
             <a:pPr lvl="4"/>
             <a:r>
-              <a:rPr lang="en-US" smtClean="0"/>
+              <a:rPr lang="en-US"/>
               <a:t>Fifth level</a:t>
             </a:r>
             <a:endParaRPr lang="en-GB"/>
@@ -1890,7 +1890,7 @@
           <a:p>
             <a:fld id="{A7E1A4B6-3731-4EDA-AC55-7C43CB84885A}" type="datetimeFigureOut">
               <a:rPr lang="en-GB" smtClean="0"/>
-              <a:t>11/07/2019</a:t>
+              <a:t>16/09/2019</a:t>
             </a:fld>
             <a:endParaRPr lang="en-GB"/>
           </a:p>
@@ -1932,7 +1932,7 @@
           <a:p>
             <a:fld id="{76576B4B-38A6-44EB-8306-DA5BB936D590}" type="slidenum">
               <a:rPr lang="en-GB" smtClean="0"/>
-              <a:t>‹#›</a:t>
+              <a:t>‹Nº›</a:t>
             </a:fld>
             <a:endParaRPr lang="en-GB"/>
           </a:p>
@@ -1993,7 +1993,7 @@
           </a:lstStyle>
           <a:p>
             <a:r>
-              <a:rPr lang="en-US" smtClean="0"/>
+              <a:rPr lang="en-US"/>
               <a:t>Click to edit Master title style</a:t>
             </a:r>
             <a:endParaRPr lang="en-GB"/>
@@ -2113,7 +2113,7 @@
           <a:p>
             <a:pPr lvl="0"/>
             <a:r>
-              <a:rPr lang="en-US" smtClean="0"/>
+              <a:rPr lang="en-US"/>
               <a:t>Click to edit Master text styles</a:t>
             </a:r>
           </a:p>
@@ -2136,7 +2136,7 @@
           <a:p>
             <a:fld id="{A7E1A4B6-3731-4EDA-AC55-7C43CB84885A}" type="datetimeFigureOut">
               <a:rPr lang="en-GB" smtClean="0"/>
-              <a:t>11/07/2019</a:t>
+              <a:t>16/09/2019</a:t>
             </a:fld>
             <a:endParaRPr lang="en-GB"/>
           </a:p>
@@ -2178,7 +2178,7 @@
           <a:p>
             <a:fld id="{76576B4B-38A6-44EB-8306-DA5BB936D590}" type="slidenum">
               <a:rPr lang="en-GB" smtClean="0"/>
-              <a:t>‹#›</a:t>
+              <a:t>‹Nº›</a:t>
             </a:fld>
             <a:endParaRPr lang="en-GB"/>
           </a:p>
@@ -2230,7 +2230,7 @@
           <a:lstStyle/>
           <a:p>
             <a:r>
-              <a:rPr lang="en-US" smtClean="0"/>
+              <a:rPr lang="en-US"/>
               <a:t>Click to edit Master title style</a:t>
             </a:r>
             <a:endParaRPr lang="en-GB"/>
@@ -2259,35 +2259,35 @@
           <a:p>
             <a:pPr lvl="0"/>
             <a:r>
-              <a:rPr lang="en-US" smtClean="0"/>
+              <a:rPr lang="en-US"/>
               <a:t>Click to edit Master text styles</a:t>
             </a:r>
           </a:p>
           <a:p>
             <a:pPr lvl="1"/>
             <a:r>
-              <a:rPr lang="en-US" smtClean="0"/>
+              <a:rPr lang="en-US"/>
               <a:t>Second level</a:t>
             </a:r>
           </a:p>
           <a:p>
             <a:pPr lvl="2"/>
             <a:r>
-              <a:rPr lang="en-US" smtClean="0"/>
+              <a:rPr lang="en-US"/>
               <a:t>Third level</a:t>
             </a:r>
           </a:p>
           <a:p>
             <a:pPr lvl="3"/>
             <a:r>
-              <a:rPr lang="en-US" smtClean="0"/>
+              <a:rPr lang="en-US"/>
               <a:t>Fourth level</a:t>
             </a:r>
           </a:p>
           <a:p>
             <a:pPr lvl="4"/>
             <a:r>
-              <a:rPr lang="en-US" smtClean="0"/>
+              <a:rPr lang="en-US"/>
               <a:t>Fifth level</a:t>
             </a:r>
             <a:endParaRPr lang="en-GB"/>
@@ -2316,35 +2316,35 @@
           <a:p>
             <a:pPr lvl="0"/>
             <a:r>
-              <a:rPr lang="en-US" smtClean="0"/>
+              <a:rPr lang="en-US"/>
               <a:t>Click to edit Master text styles</a:t>
             </a:r>
           </a:p>
           <a:p>
             <a:pPr lvl="1"/>
             <a:r>
-              <a:rPr lang="en-US" smtClean="0"/>
+              <a:rPr lang="en-US"/>
               <a:t>Second level</a:t>
             </a:r>
           </a:p>
           <a:p>
             <a:pPr lvl="2"/>
             <a:r>
-              <a:rPr lang="en-US" smtClean="0"/>
+              <a:rPr lang="en-US"/>
               <a:t>Third level</a:t>
             </a:r>
           </a:p>
           <a:p>
             <a:pPr lvl="3"/>
             <a:r>
-              <a:rPr lang="en-US" smtClean="0"/>
+              <a:rPr lang="en-US"/>
               <a:t>Fourth level</a:t>
             </a:r>
           </a:p>
           <a:p>
             <a:pPr lvl="4"/>
             <a:r>
-              <a:rPr lang="en-US" smtClean="0"/>
+              <a:rPr lang="en-US"/>
               <a:t>Fifth level</a:t>
             </a:r>
             <a:endParaRPr lang="en-GB"/>
@@ -2368,7 +2368,7 @@
           <a:p>
             <a:fld id="{A7E1A4B6-3731-4EDA-AC55-7C43CB84885A}" type="datetimeFigureOut">
               <a:rPr lang="en-GB" smtClean="0"/>
-              <a:t>11/07/2019</a:t>
+              <a:t>16/09/2019</a:t>
             </a:fld>
             <a:endParaRPr lang="en-GB"/>
           </a:p>
@@ -2410,7 +2410,7 @@
           <a:p>
             <a:fld id="{76576B4B-38A6-44EB-8306-DA5BB936D590}" type="slidenum">
               <a:rPr lang="en-GB" smtClean="0"/>
-              <a:t>‹#›</a:t>
+              <a:t>‹Nº›</a:t>
             </a:fld>
             <a:endParaRPr lang="en-GB"/>
           </a:p>
@@ -2467,7 +2467,7 @@
           <a:lstStyle/>
           <a:p>
             <a:r>
-              <a:rPr lang="en-US" smtClean="0"/>
+              <a:rPr lang="en-US"/>
               <a:t>Click to edit Master title style</a:t>
             </a:r>
             <a:endParaRPr lang="en-GB"/>
@@ -2533,7 +2533,7 @@
           <a:p>
             <a:pPr lvl="0"/>
             <a:r>
-              <a:rPr lang="en-US" smtClean="0"/>
+              <a:rPr lang="en-US"/>
               <a:t>Click to edit Master text styles</a:t>
             </a:r>
           </a:p>
@@ -2561,35 +2561,35 @@
           <a:p>
             <a:pPr lvl="0"/>
             <a:r>
-              <a:rPr lang="en-US" smtClean="0"/>
+              <a:rPr lang="en-US"/>
               <a:t>Click to edit Master text styles</a:t>
             </a:r>
           </a:p>
           <a:p>
             <a:pPr lvl="1"/>
             <a:r>
-              <a:rPr lang="en-US" smtClean="0"/>
+              <a:rPr lang="en-US"/>
               <a:t>Second level</a:t>
             </a:r>
           </a:p>
           <a:p>
             <a:pPr lvl="2"/>
             <a:r>
-              <a:rPr lang="en-US" smtClean="0"/>
+              <a:rPr lang="en-US"/>
               <a:t>Third level</a:t>
             </a:r>
           </a:p>
           <a:p>
             <a:pPr lvl="3"/>
             <a:r>
-              <a:rPr lang="en-US" smtClean="0"/>
+              <a:rPr lang="en-US"/>
               <a:t>Fourth level</a:t>
             </a:r>
           </a:p>
           <a:p>
             <a:pPr lvl="4"/>
             <a:r>
-              <a:rPr lang="en-US" smtClean="0"/>
+              <a:rPr lang="en-US"/>
               <a:t>Fifth level</a:t>
             </a:r>
             <a:endParaRPr lang="en-GB"/>
@@ -2655,7 +2655,7 @@
           <a:p>
             <a:pPr lvl="0"/>
             <a:r>
-              <a:rPr lang="en-US" smtClean="0"/>
+              <a:rPr lang="en-US"/>
               <a:t>Click to edit Master text styles</a:t>
             </a:r>
           </a:p>
@@ -2683,35 +2683,35 @@
           <a:p>
             <a:pPr lvl="0"/>
             <a:r>
-              <a:rPr lang="en-US" smtClean="0"/>
+              <a:rPr lang="en-US"/>
               <a:t>Click to edit Master text styles</a:t>
             </a:r>
           </a:p>
           <a:p>
             <a:pPr lvl="1"/>
             <a:r>
-              <a:rPr lang="en-US" smtClean="0"/>
+              <a:rPr lang="en-US"/>
               <a:t>Second level</a:t>
             </a:r>
           </a:p>
           <a:p>
             <a:pPr lvl="2"/>
             <a:r>
-              <a:rPr lang="en-US" smtClean="0"/>
+              <a:rPr lang="en-US"/>
               <a:t>Third level</a:t>
             </a:r>
           </a:p>
           <a:p>
             <a:pPr lvl="3"/>
             <a:r>
-              <a:rPr lang="en-US" smtClean="0"/>
+              <a:rPr lang="en-US"/>
               <a:t>Fourth level</a:t>
             </a:r>
           </a:p>
           <a:p>
             <a:pPr lvl="4"/>
             <a:r>
-              <a:rPr lang="en-US" smtClean="0"/>
+              <a:rPr lang="en-US"/>
               <a:t>Fifth level</a:t>
             </a:r>
             <a:endParaRPr lang="en-GB"/>
@@ -2735,7 +2735,7 @@
           <a:p>
             <a:fld id="{A7E1A4B6-3731-4EDA-AC55-7C43CB84885A}" type="datetimeFigureOut">
               <a:rPr lang="en-GB" smtClean="0"/>
-              <a:t>11/07/2019</a:t>
+              <a:t>16/09/2019</a:t>
             </a:fld>
             <a:endParaRPr lang="en-GB"/>
           </a:p>
@@ -2777,7 +2777,7 @@
           <a:p>
             <a:fld id="{76576B4B-38A6-44EB-8306-DA5BB936D590}" type="slidenum">
               <a:rPr lang="en-GB" smtClean="0"/>
-              <a:t>‹#›</a:t>
+              <a:t>‹Nº›</a:t>
             </a:fld>
             <a:endParaRPr lang="en-GB"/>
           </a:p>
@@ -2829,7 +2829,7 @@
           <a:lstStyle/>
           <a:p>
             <a:r>
-              <a:rPr lang="en-US" smtClean="0"/>
+              <a:rPr lang="en-US"/>
               <a:t>Click to edit Master title style</a:t>
             </a:r>
             <a:endParaRPr lang="en-GB"/>
@@ -2853,7 +2853,7 @@
           <a:p>
             <a:fld id="{A7E1A4B6-3731-4EDA-AC55-7C43CB84885A}" type="datetimeFigureOut">
               <a:rPr lang="en-GB" smtClean="0"/>
-              <a:t>11/07/2019</a:t>
+              <a:t>16/09/2019</a:t>
             </a:fld>
             <a:endParaRPr lang="en-GB"/>
           </a:p>
@@ -2895,7 +2895,7 @@
           <a:p>
             <a:fld id="{76576B4B-38A6-44EB-8306-DA5BB936D590}" type="slidenum">
               <a:rPr lang="en-GB" smtClean="0"/>
-              <a:t>‹#›</a:t>
+              <a:t>‹Nº›</a:t>
             </a:fld>
             <a:endParaRPr lang="en-GB"/>
           </a:p>
@@ -2948,7 +2948,7 @@
           <a:p>
             <a:fld id="{A7E1A4B6-3731-4EDA-AC55-7C43CB84885A}" type="datetimeFigureOut">
               <a:rPr lang="en-GB" smtClean="0"/>
-              <a:t>11/07/2019</a:t>
+              <a:t>16/09/2019</a:t>
             </a:fld>
             <a:endParaRPr lang="en-GB"/>
           </a:p>
@@ -2990,7 +2990,7 @@
           <a:p>
             <a:fld id="{76576B4B-38A6-44EB-8306-DA5BB936D590}" type="slidenum">
               <a:rPr lang="en-GB" smtClean="0"/>
-              <a:t>‹#›</a:t>
+              <a:t>‹Nº›</a:t>
             </a:fld>
             <a:endParaRPr lang="en-GB"/>
           </a:p>
@@ -3051,7 +3051,7 @@
           </a:lstStyle>
           <a:p>
             <a:r>
-              <a:rPr lang="en-US" smtClean="0"/>
+              <a:rPr lang="en-US"/>
               <a:t>Click to edit Master title style</a:t>
             </a:r>
             <a:endParaRPr lang="en-GB"/>
@@ -3108,35 +3108,35 @@
           <a:p>
             <a:pPr lvl="0"/>
             <a:r>
-              <a:rPr lang="en-US" smtClean="0"/>
+              <a:rPr lang="en-US"/>
               <a:t>Click to edit Master text styles</a:t>
             </a:r>
           </a:p>
           <a:p>
             <a:pPr lvl="1"/>
             <a:r>
-              <a:rPr lang="en-US" smtClean="0"/>
+              <a:rPr lang="en-US"/>
               <a:t>Second level</a:t>
             </a:r>
           </a:p>
           <a:p>
             <a:pPr lvl="2"/>
             <a:r>
-              <a:rPr lang="en-US" smtClean="0"/>
+              <a:rPr lang="en-US"/>
               <a:t>Third level</a:t>
             </a:r>
           </a:p>
           <a:p>
             <a:pPr lvl="3"/>
             <a:r>
-              <a:rPr lang="en-US" smtClean="0"/>
+              <a:rPr lang="en-US"/>
               <a:t>Fourth level</a:t>
             </a:r>
           </a:p>
           <a:p>
             <a:pPr lvl="4"/>
             <a:r>
-              <a:rPr lang="en-US" smtClean="0"/>
+              <a:rPr lang="en-US"/>
               <a:t>Fifth level</a:t>
             </a:r>
             <a:endParaRPr lang="en-GB"/>
@@ -3202,7 +3202,7 @@
           <a:p>
             <a:pPr lvl="0"/>
             <a:r>
-              <a:rPr lang="en-US" smtClean="0"/>
+              <a:rPr lang="en-US"/>
               <a:t>Click to edit Master text styles</a:t>
             </a:r>
           </a:p>
@@ -3225,7 +3225,7 @@
           <a:p>
             <a:fld id="{A7E1A4B6-3731-4EDA-AC55-7C43CB84885A}" type="datetimeFigureOut">
               <a:rPr lang="en-GB" smtClean="0"/>
-              <a:t>11/07/2019</a:t>
+              <a:t>16/09/2019</a:t>
             </a:fld>
             <a:endParaRPr lang="en-GB"/>
           </a:p>
@@ -3267,7 +3267,7 @@
           <a:p>
             <a:fld id="{76576B4B-38A6-44EB-8306-DA5BB936D590}" type="slidenum">
               <a:rPr lang="en-GB" smtClean="0"/>
-              <a:t>‹#›</a:t>
+              <a:t>‹Nº›</a:t>
             </a:fld>
             <a:endParaRPr lang="en-GB"/>
           </a:p>
@@ -3328,7 +3328,7 @@
           </a:lstStyle>
           <a:p>
             <a:r>
-              <a:rPr lang="en-US" smtClean="0"/>
+              <a:rPr lang="en-US"/>
               <a:t>Click to edit Master title style</a:t>
             </a:r>
             <a:endParaRPr lang="en-GB"/>
@@ -3455,7 +3455,7 @@
           <a:p>
             <a:pPr lvl="0"/>
             <a:r>
-              <a:rPr lang="en-US" smtClean="0"/>
+              <a:rPr lang="en-US"/>
               <a:t>Click to edit Master text styles</a:t>
             </a:r>
           </a:p>
@@ -3478,7 +3478,7 @@
           <a:p>
             <a:fld id="{A7E1A4B6-3731-4EDA-AC55-7C43CB84885A}" type="datetimeFigureOut">
               <a:rPr lang="en-GB" smtClean="0"/>
-              <a:t>11/07/2019</a:t>
+              <a:t>16/09/2019</a:t>
             </a:fld>
             <a:endParaRPr lang="en-GB"/>
           </a:p>
@@ -3520,7 +3520,7 @@
           <a:p>
             <a:fld id="{76576B4B-38A6-44EB-8306-DA5BB936D590}" type="slidenum">
               <a:rPr lang="en-GB" smtClean="0"/>
-              <a:t>‹#›</a:t>
+              <a:t>‹Nº›</a:t>
             </a:fld>
             <a:endParaRPr lang="en-GB"/>
           </a:p>
@@ -3587,7 +3587,7 @@
           <a:lstStyle/>
           <a:p>
             <a:r>
-              <a:rPr lang="en-US" smtClean="0"/>
+              <a:rPr lang="en-US"/>
               <a:t>Click to edit Master title style</a:t>
             </a:r>
             <a:endParaRPr lang="en-GB"/>
@@ -3621,35 +3621,35 @@
           <a:p>
             <a:pPr lvl="0"/>
             <a:r>
-              <a:rPr lang="en-US" smtClean="0"/>
+              <a:rPr lang="en-US"/>
               <a:t>Click to edit Master text styles</a:t>
             </a:r>
           </a:p>
           <a:p>
             <a:pPr lvl="1"/>
             <a:r>
-              <a:rPr lang="en-US" smtClean="0"/>
+              <a:rPr lang="en-US"/>
               <a:t>Second level</a:t>
             </a:r>
           </a:p>
           <a:p>
             <a:pPr lvl="2"/>
             <a:r>
-              <a:rPr lang="en-US" smtClean="0"/>
+              <a:rPr lang="en-US"/>
               <a:t>Third level</a:t>
             </a:r>
           </a:p>
           <a:p>
             <a:pPr lvl="3"/>
             <a:r>
-              <a:rPr lang="en-US" smtClean="0"/>
+              <a:rPr lang="en-US"/>
               <a:t>Fourth level</a:t>
             </a:r>
           </a:p>
           <a:p>
             <a:pPr lvl="4"/>
             <a:r>
-              <a:rPr lang="en-US" smtClean="0"/>
+              <a:rPr lang="en-US"/>
               <a:t>Fifth level</a:t>
             </a:r>
             <a:endParaRPr lang="en-GB"/>
@@ -3691,7 +3691,7 @@
           <a:p>
             <a:fld id="{A7E1A4B6-3731-4EDA-AC55-7C43CB84885A}" type="datetimeFigureOut">
               <a:rPr lang="en-GB" smtClean="0"/>
-              <a:t>11/07/2019</a:t>
+              <a:t>16/09/2019</a:t>
             </a:fld>
             <a:endParaRPr lang="en-GB"/>
           </a:p>
@@ -3769,7 +3769,7 @@
           <a:p>
             <a:fld id="{76576B4B-38A6-44EB-8306-DA5BB936D590}" type="slidenum">
               <a:rPr lang="en-GB" smtClean="0"/>
-              <a:t>‹#›</a:t>
+              <a:t>‹Nº›</a:t>
             </a:fld>
             <a:endParaRPr lang="en-GB"/>
           </a:p>
@@ -4119,16 +4119,12 @@
           <a:lstStyle/>
           <a:p>
             <a:r>
-              <a:rPr lang="en-GB" sz="4000" dirty="0" smtClean="0">
+              <a:rPr lang="en-GB" sz="4000" dirty="0">
                 <a:latin typeface="Segoe UI" panose="020B0502040204020203" pitchFamily="34" charset="0"/>
                 <a:cs typeface="Segoe UI" panose="020B0502040204020203" pitchFamily="34" charset="0"/>
               </a:rPr>
               <a:t>The Group and Organisation Future of Conservation Survey Project</a:t>
             </a:r>
-            <a:endParaRPr lang="en-GB" sz="4000" dirty="0">
-              <a:latin typeface="Segoe UI" panose="020B0502040204020203" pitchFamily="34" charset="0"/>
-              <a:cs typeface="Segoe UI" panose="020B0502040204020203" pitchFamily="34" charset="0"/>
-            </a:endParaRPr>
           </a:p>
         </p:txBody>
       </p:sp>
@@ -4387,7 +4383,7 @@
           <a:lstStyle/>
           <a:p>
             <a:r>
-              <a:rPr lang="en-GB" sz="3000" dirty="0" smtClean="0">
+              <a:rPr lang="en-GB" sz="3000" dirty="0">
                 <a:solidFill>
                   <a:schemeClr val="accent3"/>
                 </a:solidFill>
@@ -4396,13 +4392,6 @@
               </a:rPr>
               <a:t>Workshop Slides</a:t>
             </a:r>
-            <a:endParaRPr lang="en-GB" sz="3000" dirty="0">
-              <a:solidFill>
-                <a:schemeClr val="accent3"/>
-              </a:solidFill>
-              <a:latin typeface="Segoe UI" panose="020B0502040204020203" pitchFamily="34" charset="0"/>
-              <a:cs typeface="Segoe UI" panose="020B0502040204020203" pitchFamily="34" charset="0"/>
-            </a:endParaRPr>
           </a:p>
         </p:txBody>
       </p:sp>
@@ -4451,13 +4440,6 @@
   <p:clrMapOvr>
     <a:masterClrMapping/>
   </p:clrMapOvr>
-  <p:timing>
-    <p:tnLst>
-      <p:par>
-        <p:cTn id="1" dur="indefinite" restart="never" nodeType="tmRoot"/>
-      </p:par>
-    </p:tnLst>
-  </p:timing>
 </p:sld>
 </file>
 
@@ -4603,13 +4585,8 @@
             <a:pPr algn="r"/>
             <a:r>
               <a:rPr lang="en-GB" sz="2000" dirty="0"/>
-              <a:t>Corner </a:t>
-            </a:r>
-            <a:r>
-              <a:rPr lang="en-GB" sz="2000" dirty="0" smtClean="0"/>
-              <a:t>3</a:t>
-            </a:r>
-            <a:endParaRPr lang="en-GB" sz="2000" dirty="0"/>
+              <a:t>Corner 3</a:t>
+            </a:r>
           </a:p>
           <a:p>
             <a:pPr algn="ctr">
@@ -4619,13 +4596,8 @@
             </a:pPr>
             <a:r>
               <a:rPr lang="en-GB" sz="2000" i="1" dirty="0"/>
-              <a:t>Market </a:t>
-            </a:r>
-            <a:r>
-              <a:rPr lang="en-GB" sz="2000" i="1" dirty="0" err="1"/>
-              <a:t>Ecocentrism</a:t>
-            </a:r>
-            <a:endParaRPr lang="en-GB" sz="2000" i="1" dirty="0"/>
+              <a:t>Critical Social Science</a:t>
+            </a:r>
           </a:p>
         </p:txBody>
       </p:sp>
@@ -4639,13 +4611,6 @@
   <p:clrMapOvr>
     <a:masterClrMapping/>
   </p:clrMapOvr>
-  <p:timing>
-    <p:tnLst>
-      <p:par>
-        <p:cTn id="1" dur="indefinite" restart="never" nodeType="tmRoot"/>
-      </p:par>
-    </p:tnLst>
-  </p:timing>
 </p:sld>
 </file>
 
@@ -4787,13 +4752,8 @@
           <a:p>
             <a:r>
               <a:rPr lang="en-GB" sz="2000" dirty="0"/>
-              <a:t>Corner </a:t>
-            </a:r>
-            <a:r>
-              <a:rPr lang="en-GB" sz="2000" dirty="0" smtClean="0"/>
-              <a:t>4</a:t>
-            </a:r>
-            <a:endParaRPr lang="en-GB" sz="2000" dirty="0"/>
+              <a:t>Corner 4</a:t>
+            </a:r>
           </a:p>
           <a:p>
             <a:pPr algn="ctr">
@@ -4803,7 +4763,7 @@
             </a:pPr>
             <a:r>
               <a:rPr lang="en-GB" sz="2000" i="1" dirty="0"/>
-              <a:t>Critical Social Science</a:t>
+              <a:t>Market Ecocentrism</a:t>
             </a:r>
           </a:p>
         </p:txBody>
@@ -4818,13 +4778,6 @@
   <p:clrMapOvr>
     <a:masterClrMapping/>
   </p:clrMapOvr>
-  <p:timing>
-    <p:tnLst>
-      <p:par>
-        <p:cTn id="1" dur="indefinite" restart="never" nodeType="tmRoot"/>
-      </p:par>
-    </p:tnLst>
-  </p:timing>
 </p:sld>
 </file>
 
@@ -4971,7 +4924,7 @@
           <a:lstStyle/>
           <a:p>
             <a:r>
-              <a:rPr lang="en-GB" sz="4000" dirty="0" smtClean="0">
+              <a:rPr lang="en-GB" sz="4000" dirty="0">
                 <a:solidFill>
                   <a:schemeClr val="tx2"/>
                 </a:solidFill>
@@ -4980,13 +4933,6 @@
               </a:rPr>
               <a:t>Individuals’ conservation values…</a:t>
             </a:r>
-            <a:endParaRPr lang="en-GB" sz="4000" dirty="0">
-              <a:solidFill>
-                <a:schemeClr val="tx2"/>
-              </a:solidFill>
-              <a:latin typeface="Segoe UI" panose="020B0502040204020203" pitchFamily="34" charset="0"/>
-              <a:cs typeface="Segoe UI" panose="020B0502040204020203" pitchFamily="34" charset="0"/>
-            </a:endParaRPr>
           </a:p>
         </p:txBody>
       </p:sp>
@@ -5046,13 +4992,6 @@
   <p:clrMapOvr>
     <a:masterClrMapping/>
   </p:clrMapOvr>
-  <p:timing>
-    <p:tnLst>
-      <p:par>
-        <p:cTn id="1" dur="indefinite" restart="never" nodeType="tmRoot"/>
-      </p:par>
-    </p:tnLst>
-  </p:timing>
 </p:sld>
 </file>
 
@@ -5104,24 +5043,14 @@
               </a:spcBef>
             </a:pPr>
             <a:r>
-              <a:rPr lang="en-GB" sz="2000" dirty="0" smtClean="0">
+              <a:rPr lang="en-GB" sz="2000" dirty="0">
                 <a:solidFill>
                   <a:schemeClr val="tx2"/>
                 </a:solidFill>
                 <a:latin typeface="Segoe UI" panose="020B0502040204020203" pitchFamily="34" charset="0"/>
                 <a:cs typeface="Segoe UI" panose="020B0502040204020203" pitchFamily="34" charset="0"/>
               </a:rPr>
-              <a:t>Do </a:t>
-            </a:r>
-            <a:r>
-              <a:rPr lang="en-GB" sz="2000" dirty="0">
-                <a:solidFill>
-                  <a:schemeClr val="tx2"/>
-                </a:solidFill>
-                <a:latin typeface="Segoe UI" panose="020B0502040204020203" pitchFamily="34" charset="0"/>
-                <a:cs typeface="Segoe UI" panose="020B0502040204020203" pitchFamily="34" charset="0"/>
-              </a:rPr>
-              <a:t>the conservation values people hold impact their organisation, or vice-versa? How? </a:t>
+              <a:t>Do the conservation values people hold impact their organisation, or vice-versa? How? </a:t>
             </a:r>
           </a:p>
           <a:p>
@@ -5161,25 +5090,8 @@
                 <a:latin typeface="Segoe UI" panose="020B0502040204020203" pitchFamily="34" charset="0"/>
                 <a:cs typeface="Segoe UI" panose="020B0502040204020203" pitchFamily="34" charset="0"/>
               </a:rPr>
-              <a:t>Do you think your organisation portrays one of these values more specifically? Which? What does that mean</a:t>
-            </a:r>
-            <a:r>
-              <a:rPr lang="en-GB" sz="2000" dirty="0" smtClean="0">
-                <a:solidFill>
-                  <a:schemeClr val="tx2"/>
-                </a:solidFill>
-                <a:latin typeface="Segoe UI" panose="020B0502040204020203" pitchFamily="34" charset="0"/>
-                <a:cs typeface="Segoe UI" panose="020B0502040204020203" pitchFamily="34" charset="0"/>
-              </a:rPr>
-              <a:t>?</a:t>
-            </a:r>
-            <a:endParaRPr lang="en-GB" sz="2000" dirty="0">
-              <a:solidFill>
-                <a:schemeClr val="tx2"/>
-              </a:solidFill>
-              <a:latin typeface="Segoe UI" panose="020B0502040204020203" pitchFamily="34" charset="0"/>
-              <a:cs typeface="Segoe UI" panose="020B0502040204020203" pitchFamily="34" charset="0"/>
-            </a:endParaRPr>
+              <a:t>Do you think your organisation portrays one of these values more specifically? Which? What does that mean?</a:t>
+            </a:r>
           </a:p>
         </p:txBody>
       </p:sp>
@@ -5206,7 +5118,7 @@
           <a:lstStyle/>
           <a:p>
             <a:r>
-              <a:rPr lang="en-GB" sz="4000" dirty="0" smtClean="0">
+              <a:rPr lang="en-GB" sz="4000" dirty="0">
                 <a:solidFill>
                   <a:schemeClr val="tx2"/>
                 </a:solidFill>
@@ -5215,13 +5127,6 @@
               </a:rPr>
               <a:t>Organisation’s conservation values…</a:t>
             </a:r>
-            <a:endParaRPr lang="en-GB" sz="4000" dirty="0">
-              <a:solidFill>
-                <a:schemeClr val="tx2"/>
-              </a:solidFill>
-              <a:latin typeface="Segoe UI" panose="020B0502040204020203" pitchFamily="34" charset="0"/>
-              <a:cs typeface="Segoe UI" panose="020B0502040204020203" pitchFamily="34" charset="0"/>
-            </a:endParaRPr>
           </a:p>
         </p:txBody>
       </p:sp>
@@ -5281,13 +5186,6 @@
   <p:clrMapOvr>
     <a:masterClrMapping/>
   </p:clrMapOvr>
-  <p:timing>
-    <p:tnLst>
-      <p:par>
-        <p:cTn id="1" dur="indefinite" restart="never" nodeType="tmRoot"/>
-      </p:par>
-    </p:tnLst>
-  </p:timing>
 </p:sld>
 </file>
 
@@ -5331,7 +5229,7 @@
           <a:lstStyle/>
           <a:p>
             <a:r>
-              <a:rPr lang="en-GB" sz="4000" dirty="0" smtClean="0">
+              <a:rPr lang="en-GB" sz="4000" dirty="0">
                 <a:solidFill>
                   <a:schemeClr val="tx2"/>
                 </a:solidFill>
@@ -5341,7 +5239,7 @@
               <a:t>Now to find out where you </a:t>
             </a:r>
             <a:r>
-              <a:rPr lang="en-GB" sz="4000" i="1" dirty="0" smtClean="0">
+              <a:rPr lang="en-GB" sz="4000" i="1" dirty="0">
                 <a:solidFill>
                   <a:schemeClr val="tx2"/>
                 </a:solidFill>
@@ -5351,7 +5249,7 @@
               <a:t>really</a:t>
             </a:r>
             <a:r>
-              <a:rPr lang="en-GB" sz="4000" dirty="0" smtClean="0">
+              <a:rPr lang="en-GB" sz="4000" dirty="0">
                 <a:solidFill>
                   <a:schemeClr val="tx2"/>
                 </a:solidFill>
@@ -5360,13 +5258,6 @@
               </a:rPr>
               <a:t> are</a:t>
             </a:r>
-            <a:endParaRPr lang="en-GB" sz="4000" dirty="0">
-              <a:solidFill>
-                <a:schemeClr val="tx2"/>
-              </a:solidFill>
-              <a:latin typeface="Segoe UI" panose="020B0502040204020203" pitchFamily="34" charset="0"/>
-              <a:cs typeface="Segoe UI" panose="020B0502040204020203" pitchFamily="34" charset="0"/>
-            </a:endParaRPr>
           </a:p>
         </p:txBody>
       </p:sp>
@@ -5402,7 +5293,7 @@
               <a:buNone/>
             </a:pPr>
             <a:r>
-              <a:rPr lang="en-GB" sz="2000" dirty="0" smtClean="0">
+              <a:rPr lang="en-GB" sz="2000" dirty="0">
                 <a:solidFill>
                   <a:srgbClr val="FF0000"/>
                 </a:solidFill>
@@ -5411,13 +5302,6 @@
               </a:rPr>
               <a:t>Go to WEBLINK and complete the survey</a:t>
             </a:r>
-            <a:endParaRPr lang="en-GB" sz="2000" dirty="0">
-              <a:solidFill>
-                <a:srgbClr val="FF0000"/>
-              </a:solidFill>
-              <a:latin typeface="Segoe UI" panose="020B0502040204020203" pitchFamily="34" charset="0"/>
-              <a:cs typeface="Segoe UI" panose="020B0502040204020203" pitchFamily="34" charset="0"/>
-            </a:endParaRPr>
           </a:p>
         </p:txBody>
       </p:sp>
@@ -5531,13 +5415,6 @@
   <p:clrMapOvr>
     <a:masterClrMapping/>
   </p:clrMapOvr>
-  <p:timing>
-    <p:tnLst>
-      <p:par>
-        <p:cTn id="1" dur="indefinite" restart="never" nodeType="tmRoot"/>
-      </p:par>
-    </p:tnLst>
-  </p:timing>
 </p:sld>
 </file>
 
@@ -5583,18 +5460,13 @@
               <a:buNone/>
             </a:pPr>
             <a:r>
-              <a:rPr lang="en-GB" dirty="0" smtClean="0">
+              <a:rPr lang="en-GB" dirty="0">
                 <a:solidFill>
                   <a:srgbClr val="FF0000"/>
                 </a:solidFill>
               </a:rPr>
               <a:t>[insert charts here from your GO-FOX results page]</a:t>
             </a:r>
-            <a:endParaRPr lang="en-GB" dirty="0">
-              <a:solidFill>
-                <a:srgbClr val="FF0000"/>
-              </a:solidFill>
-            </a:endParaRPr>
           </a:p>
         </p:txBody>
       </p:sp>
@@ -5621,7 +5493,7 @@
           <a:lstStyle/>
           <a:p>
             <a:r>
-              <a:rPr lang="en-GB" sz="4000" dirty="0" smtClean="0">
+              <a:rPr lang="en-GB" sz="4000" dirty="0">
                 <a:solidFill>
                   <a:schemeClr val="tx2"/>
                 </a:solidFill>
@@ -5630,13 +5502,6 @@
               </a:rPr>
               <a:t>Your group’s results</a:t>
             </a:r>
-            <a:endParaRPr lang="en-GB" sz="4000" dirty="0">
-              <a:solidFill>
-                <a:schemeClr val="tx2"/>
-              </a:solidFill>
-              <a:latin typeface="Segoe UI" panose="020B0502040204020203" pitchFamily="34" charset="0"/>
-              <a:cs typeface="Segoe UI" panose="020B0502040204020203" pitchFamily="34" charset="0"/>
-            </a:endParaRPr>
           </a:p>
         </p:txBody>
       </p:sp>
@@ -5747,24 +5612,14 @@
               </a:spcBef>
             </a:pPr>
             <a:r>
-              <a:rPr lang="en-GB" sz="2000" dirty="0" smtClean="0">
+              <a:rPr lang="en-GB" sz="2000" dirty="0">
                 <a:solidFill>
                   <a:schemeClr val="tx2"/>
                 </a:solidFill>
                 <a:latin typeface="Segoe UI" panose="020B0502040204020203" pitchFamily="34" charset="0"/>
                 <a:cs typeface="Segoe UI" panose="020B0502040204020203" pitchFamily="34" charset="0"/>
               </a:rPr>
-              <a:t>Are </a:t>
-            </a:r>
-            <a:r>
-              <a:rPr lang="en-GB" sz="2000" dirty="0">
-                <a:solidFill>
-                  <a:schemeClr val="tx2"/>
-                </a:solidFill>
-                <a:latin typeface="Segoe UI" panose="020B0502040204020203" pitchFamily="34" charset="0"/>
-                <a:cs typeface="Segoe UI" panose="020B0502040204020203" pitchFamily="34" charset="0"/>
-              </a:rPr>
-              <a:t>these the results you expected for this organisation/team?</a:t>
+              <a:t>Are these the results you expected for this organisation/team?</a:t>
             </a:r>
           </a:p>
           <a:p>
@@ -5777,24 +5632,14 @@
               </a:spcBef>
             </a:pPr>
             <a:r>
-              <a:rPr lang="en-GB" sz="2000" dirty="0" smtClean="0">
+              <a:rPr lang="en-GB" sz="2000" dirty="0">
                 <a:solidFill>
                   <a:schemeClr val="tx2"/>
                 </a:solidFill>
                 <a:latin typeface="Segoe UI" panose="020B0502040204020203" pitchFamily="34" charset="0"/>
                 <a:cs typeface="Segoe UI" panose="020B0502040204020203" pitchFamily="34" charset="0"/>
               </a:rPr>
-              <a:t>How </a:t>
-            </a:r>
-            <a:r>
-              <a:rPr lang="en-GB" sz="2000" dirty="0">
-                <a:solidFill>
-                  <a:schemeClr val="tx2"/>
-                </a:solidFill>
-                <a:latin typeface="Segoe UI" panose="020B0502040204020203" pitchFamily="34" charset="0"/>
-                <a:cs typeface="Segoe UI" panose="020B0502040204020203" pitchFamily="34" charset="0"/>
-              </a:rPr>
-              <a:t>do you think your conservation values influence how you undertake your day to day work?</a:t>
+              <a:t>How do you think your conservation values influence how you undertake your day to day work?</a:t>
             </a:r>
           </a:p>
           <a:p>
@@ -5807,24 +5652,14 @@
               </a:spcBef>
             </a:pPr>
             <a:r>
-              <a:rPr lang="en-GB" sz="2000" dirty="0" smtClean="0">
+              <a:rPr lang="en-GB" sz="2000" dirty="0">
                 <a:solidFill>
                   <a:schemeClr val="tx2"/>
                 </a:solidFill>
                 <a:latin typeface="Segoe UI" panose="020B0502040204020203" pitchFamily="34" charset="0"/>
                 <a:cs typeface="Segoe UI" panose="020B0502040204020203" pitchFamily="34" charset="0"/>
               </a:rPr>
-              <a:t>Are </a:t>
-            </a:r>
-            <a:r>
-              <a:rPr lang="en-GB" sz="2000" dirty="0">
-                <a:solidFill>
-                  <a:schemeClr val="tx2"/>
-                </a:solidFill>
-                <a:latin typeface="Segoe UI" panose="020B0502040204020203" pitchFamily="34" charset="0"/>
-                <a:cs typeface="Segoe UI" panose="020B0502040204020203" pitchFamily="34" charset="0"/>
-              </a:rPr>
-              <a:t>there other conservation values that you think are very important that affect the way you do your work?</a:t>
+              <a:t>Are there other conservation values that you think are very important that affect the way you do your work?</a:t>
             </a:r>
           </a:p>
           <a:p>
@@ -5837,42 +5672,15 @@
               </a:spcBef>
             </a:pPr>
             <a:r>
-              <a:rPr lang="en-GB" sz="2000" dirty="0" smtClean="0">
+              <a:rPr lang="en-GB" sz="2000" dirty="0">
                 <a:solidFill>
                   <a:schemeClr val="tx2"/>
                 </a:solidFill>
                 <a:latin typeface="Segoe UI" panose="020B0502040204020203" pitchFamily="34" charset="0"/>
                 <a:cs typeface="Segoe UI" panose="020B0502040204020203" pitchFamily="34" charset="0"/>
               </a:rPr>
-              <a:t>Would </a:t>
-            </a:r>
-            <a:r>
-              <a:rPr lang="en-GB" sz="2000" dirty="0">
-                <a:solidFill>
-                  <a:schemeClr val="tx2"/>
-                </a:solidFill>
-                <a:latin typeface="Segoe UI" panose="020B0502040204020203" pitchFamily="34" charset="0"/>
-                <a:cs typeface="Segoe UI" panose="020B0502040204020203" pitchFamily="34" charset="0"/>
-              </a:rPr>
-              <a:t>you expect your colleagues to share your values? Does it matter if they have different values to you</a:t>
-            </a:r>
-            <a:r>
-              <a:rPr lang="en-GB" sz="2000" dirty="0" smtClean="0">
-                <a:solidFill>
-                  <a:schemeClr val="tx2"/>
-                </a:solidFill>
-                <a:latin typeface="Segoe UI" panose="020B0502040204020203" pitchFamily="34" charset="0"/>
-                <a:cs typeface="Segoe UI" panose="020B0502040204020203" pitchFamily="34" charset="0"/>
-              </a:rPr>
-              <a:t>?</a:t>
-            </a:r>
-            <a:endParaRPr lang="en-GB" sz="2000" dirty="0">
-              <a:solidFill>
-                <a:schemeClr val="tx2"/>
-              </a:solidFill>
-              <a:latin typeface="Segoe UI" panose="020B0502040204020203" pitchFamily="34" charset="0"/>
-              <a:cs typeface="Segoe UI" panose="020B0502040204020203" pitchFamily="34" charset="0"/>
-            </a:endParaRPr>
+              <a:t>Would you expect your colleagues to share your values? Does it matter if they have different values to you?</a:t>
+            </a:r>
           </a:p>
         </p:txBody>
       </p:sp>
@@ -5899,7 +5707,7 @@
           <a:lstStyle/>
           <a:p>
             <a:r>
-              <a:rPr lang="en-GB" sz="4000" dirty="0" smtClean="0">
+              <a:rPr lang="en-GB" sz="4000" dirty="0">
                 <a:solidFill>
                   <a:srgbClr val="FF0000"/>
                 </a:solidFill>
@@ -5909,7 +5717,7 @@
               <a:t>[name of group/organisation]</a:t>
             </a:r>
             <a:r>
-              <a:rPr lang="en-GB" sz="4000" dirty="0" smtClean="0">
+              <a:rPr lang="en-GB" sz="4000" dirty="0">
                 <a:solidFill>
                   <a:schemeClr val="tx2"/>
                 </a:solidFill>
@@ -5918,13 +5726,6 @@
               </a:rPr>
               <a:t>’s conservation values…</a:t>
             </a:r>
-            <a:endParaRPr lang="en-GB" sz="4000" dirty="0">
-              <a:solidFill>
-                <a:schemeClr val="tx2"/>
-              </a:solidFill>
-              <a:latin typeface="Segoe UI" panose="020B0502040204020203" pitchFamily="34" charset="0"/>
-              <a:cs typeface="Segoe UI" panose="020B0502040204020203" pitchFamily="34" charset="0"/>
-            </a:endParaRPr>
           </a:p>
         </p:txBody>
       </p:sp>
@@ -5984,13 +5785,6 @@
   <p:clrMapOvr>
     <a:masterClrMapping/>
   </p:clrMapOvr>
-  <p:timing>
-    <p:tnLst>
-      <p:par>
-        <p:cTn id="1" dur="indefinite" restart="never" nodeType="tmRoot"/>
-      </p:par>
-    </p:tnLst>
-  </p:timing>
 </p:sld>
 </file>
 
@@ -6042,24 +5836,14 @@
               </a:spcBef>
             </a:pPr>
             <a:r>
-              <a:rPr lang="en-GB" sz="2000" dirty="0" smtClean="0">
+              <a:rPr lang="en-GB" sz="2000" dirty="0">
                 <a:solidFill>
                   <a:schemeClr val="tx2"/>
                 </a:solidFill>
                 <a:latin typeface="Segoe UI" panose="020B0502040204020203" pitchFamily="34" charset="0"/>
                 <a:cs typeface="Segoe UI" panose="020B0502040204020203" pitchFamily="34" charset="0"/>
               </a:rPr>
-              <a:t>Does </a:t>
-            </a:r>
-            <a:r>
-              <a:rPr lang="en-GB" sz="2000" dirty="0">
-                <a:solidFill>
-                  <a:schemeClr val="tx2"/>
-                </a:solidFill>
-                <a:latin typeface="Segoe UI" panose="020B0502040204020203" pitchFamily="34" charset="0"/>
-                <a:cs typeface="Segoe UI" panose="020B0502040204020203" pitchFamily="34" charset="0"/>
-              </a:rPr>
-              <a:t>your colleagues’ position affect how you feel about them (professionally)? </a:t>
+              <a:t>Does your colleagues’ position affect how you feel about them (professionally)? </a:t>
             </a:r>
           </a:p>
           <a:p>
@@ -6072,24 +5856,14 @@
               </a:spcBef>
             </a:pPr>
             <a:r>
-              <a:rPr lang="en-GB" sz="2000" dirty="0" smtClean="0">
+              <a:rPr lang="en-GB" sz="2000" dirty="0">
                 <a:solidFill>
                   <a:schemeClr val="tx2"/>
                 </a:solidFill>
                 <a:latin typeface="Segoe UI" panose="020B0502040204020203" pitchFamily="34" charset="0"/>
                 <a:cs typeface="Segoe UI" panose="020B0502040204020203" pitchFamily="34" charset="0"/>
               </a:rPr>
-              <a:t>Do </a:t>
-            </a:r>
-            <a:r>
-              <a:rPr lang="en-GB" sz="2000" dirty="0">
-                <a:solidFill>
-                  <a:schemeClr val="tx2"/>
-                </a:solidFill>
-                <a:latin typeface="Segoe UI" panose="020B0502040204020203" pitchFamily="34" charset="0"/>
-                <a:cs typeface="Segoe UI" panose="020B0502040204020203" pitchFamily="34" charset="0"/>
-              </a:rPr>
-              <a:t>the conservation values people hold impact their organisation, or vice-versa? How? </a:t>
+              <a:t>Do the conservation values people hold impact their organisation, or vice-versa? How? </a:t>
             </a:r>
           </a:p>
           <a:p>
@@ -6102,24 +5876,14 @@
               </a:spcBef>
             </a:pPr>
             <a:r>
-              <a:rPr lang="en-GB" sz="2000" dirty="0" smtClean="0">
+              <a:rPr lang="en-GB" sz="2000" dirty="0">
                 <a:solidFill>
                   <a:schemeClr val="tx2"/>
                 </a:solidFill>
                 <a:latin typeface="Segoe UI" panose="020B0502040204020203" pitchFamily="34" charset="0"/>
                 <a:cs typeface="Segoe UI" panose="020B0502040204020203" pitchFamily="34" charset="0"/>
               </a:rPr>
-              <a:t>What </a:t>
-            </a:r>
-            <a:r>
-              <a:rPr lang="en-GB" sz="2000" dirty="0">
-                <a:solidFill>
-                  <a:schemeClr val="tx2"/>
-                </a:solidFill>
-                <a:latin typeface="Segoe UI" panose="020B0502040204020203" pitchFamily="34" charset="0"/>
-                <a:cs typeface="Segoe UI" panose="020B0502040204020203" pitchFamily="34" charset="0"/>
-              </a:rPr>
-              <a:t>would you feel is the ideal mix or proportion of people in each profile for your organisation to function, and be adequately represented as a whole?</a:t>
+              <a:t>What would you feel is the ideal mix or proportion of people in each profile for your organisation to function, and be adequately represented as a whole?</a:t>
             </a:r>
           </a:p>
           <a:p>
@@ -6132,24 +5896,14 @@
               </a:spcBef>
             </a:pPr>
             <a:r>
-              <a:rPr lang="en-GB" sz="2000" dirty="0" smtClean="0">
+              <a:rPr lang="en-GB" sz="2000" dirty="0">
                 <a:solidFill>
                   <a:schemeClr val="tx2"/>
                 </a:solidFill>
                 <a:latin typeface="Segoe UI" panose="020B0502040204020203" pitchFamily="34" charset="0"/>
                 <a:cs typeface="Segoe UI" panose="020B0502040204020203" pitchFamily="34" charset="0"/>
               </a:rPr>
-              <a:t>Do </a:t>
-            </a:r>
-            <a:r>
-              <a:rPr lang="en-GB" sz="2000" dirty="0">
-                <a:solidFill>
-                  <a:schemeClr val="tx2"/>
-                </a:solidFill>
-                <a:latin typeface="Segoe UI" panose="020B0502040204020203" pitchFamily="34" charset="0"/>
-                <a:cs typeface="Segoe UI" panose="020B0502040204020203" pitchFamily="34" charset="0"/>
-              </a:rPr>
-              <a:t>you think your organisation portrays one of these values more specifically? Which? What does that mean?</a:t>
+              <a:t>Do you think your organisation portrays one of these values more specifically? Which? What does that mean?</a:t>
             </a:r>
           </a:p>
         </p:txBody>
@@ -6177,7 +5931,7 @@
           <a:lstStyle/>
           <a:p>
             <a:r>
-              <a:rPr lang="en-GB" sz="4000" dirty="0" smtClean="0">
+              <a:rPr lang="en-GB" sz="4000" dirty="0">
                 <a:solidFill>
                   <a:srgbClr val="FF0000"/>
                 </a:solidFill>
@@ -6187,7 +5941,7 @@
               <a:t>[name of group/organisation]</a:t>
             </a:r>
             <a:r>
-              <a:rPr lang="en-GB" sz="4000" dirty="0" smtClean="0">
+              <a:rPr lang="en-GB" sz="4000" dirty="0">
                 <a:solidFill>
                   <a:schemeClr val="tx2"/>
                 </a:solidFill>
@@ -6196,13 +5950,6 @@
               </a:rPr>
               <a:t>’s conservation values…</a:t>
             </a:r>
-            <a:endParaRPr lang="en-GB" sz="4000" dirty="0">
-              <a:solidFill>
-                <a:schemeClr val="tx2"/>
-              </a:solidFill>
-              <a:latin typeface="Segoe UI" panose="020B0502040204020203" pitchFamily="34" charset="0"/>
-              <a:cs typeface="Segoe UI" panose="020B0502040204020203" pitchFamily="34" charset="0"/>
-            </a:endParaRPr>
           </a:p>
         </p:txBody>
       </p:sp>
@@ -6262,13 +6009,6 @@
   <p:clrMapOvr>
     <a:masterClrMapping/>
   </p:clrMapOvr>
-  <p:timing>
-    <p:tnLst>
-      <p:par>
-        <p:cTn id="1" dur="indefinite" restart="never" nodeType="tmRoot"/>
-      </p:par>
-    </p:tnLst>
-  </p:timing>
 </p:sld>
 </file>
 
@@ -6409,18 +6149,13 @@
           <a:lstStyle/>
           <a:p>
             <a:r>
-              <a:rPr lang="en-GB" b="1" dirty="0" smtClean="0">
+              <a:rPr lang="en-GB" b="1" dirty="0">
                 <a:solidFill>
                   <a:schemeClr val="accent2"/>
                 </a:solidFill>
               </a:rPr>
               <a:t>Values</a:t>
             </a:r>
-            <a:endParaRPr lang="en-GB" b="1" dirty="0">
-              <a:solidFill>
-                <a:schemeClr val="accent2"/>
-              </a:solidFill>
-            </a:endParaRPr>
           </a:p>
         </p:txBody>
       </p:sp>
@@ -6447,7 +6182,7 @@
           <a:lstStyle/>
           <a:p>
             <a:r>
-              <a:rPr lang="en-GB" sz="4000" dirty="0" smtClean="0">
+              <a:rPr lang="en-GB" sz="4000" dirty="0">
                 <a:solidFill>
                   <a:schemeClr val="tx2"/>
                 </a:solidFill>
@@ -6456,13 +6191,6 @@
               </a:rPr>
               <a:t>Organisational Values and Mission</a:t>
             </a:r>
-            <a:endParaRPr lang="en-GB" sz="4000" dirty="0">
-              <a:solidFill>
-                <a:schemeClr val="tx2"/>
-              </a:solidFill>
-              <a:latin typeface="Segoe UI" panose="020B0502040204020203" pitchFamily="34" charset="0"/>
-              <a:cs typeface="Segoe UI" panose="020B0502040204020203" pitchFamily="34" charset="0"/>
-            </a:endParaRPr>
           </a:p>
         </p:txBody>
       </p:sp>
@@ -6581,25 +6309,8 @@
                 <a:latin typeface="Segoe UI" panose="020B0502040204020203" pitchFamily="34" charset="0"/>
                 <a:cs typeface="Segoe UI" panose="020B0502040204020203" pitchFamily="34" charset="0"/>
               </a:rPr>
-              <a:t>The shared values that underpin the way you work, behave and your relationships with </a:t>
-            </a:r>
-            <a:r>
-              <a:rPr lang="en-GB" sz="2000" dirty="0" smtClean="0">
-                <a:solidFill>
-                  <a:schemeClr val="tx2"/>
-                </a:solidFill>
-                <a:latin typeface="Segoe UI" panose="020B0502040204020203" pitchFamily="34" charset="0"/>
-                <a:cs typeface="Segoe UI" panose="020B0502040204020203" pitchFamily="34" charset="0"/>
-              </a:rPr>
-              <a:t>others</a:t>
-            </a:r>
-            <a:endParaRPr lang="en-GB" sz="2000" dirty="0">
-              <a:solidFill>
-                <a:schemeClr val="tx2"/>
-              </a:solidFill>
-              <a:latin typeface="Segoe UI" panose="020B0502040204020203" pitchFamily="34" charset="0"/>
-              <a:cs typeface="Segoe UI" panose="020B0502040204020203" pitchFamily="34" charset="0"/>
-            </a:endParaRPr>
+              <a:t>The shared values that underpin the way you work, behave and your relationships with others</a:t>
+            </a:r>
           </a:p>
           <a:p>
             <a:pPr>
@@ -6619,25 +6330,8 @@
                 <a:latin typeface="Segoe UI" panose="020B0502040204020203" pitchFamily="34" charset="0"/>
                 <a:cs typeface="Segoe UI" panose="020B0502040204020203" pitchFamily="34" charset="0"/>
               </a:rPr>
-              <a:t>Help determine your strategies and the way in which you work day to </a:t>
-            </a:r>
-            <a:r>
-              <a:rPr lang="en-GB" sz="2000" dirty="0" smtClean="0">
-                <a:solidFill>
-                  <a:schemeClr val="tx2"/>
-                </a:solidFill>
-                <a:latin typeface="Segoe UI" panose="020B0502040204020203" pitchFamily="34" charset="0"/>
-                <a:cs typeface="Segoe UI" panose="020B0502040204020203" pitchFamily="34" charset="0"/>
-              </a:rPr>
-              <a:t>day</a:t>
-            </a:r>
-            <a:endParaRPr lang="en-GB" sz="2000" dirty="0">
-              <a:solidFill>
-                <a:schemeClr val="tx2"/>
-              </a:solidFill>
-              <a:latin typeface="Segoe UI" panose="020B0502040204020203" pitchFamily="34" charset="0"/>
-              <a:cs typeface="Segoe UI" panose="020B0502040204020203" pitchFamily="34" charset="0"/>
-            </a:endParaRPr>
+              <a:t>Help determine your strategies and the way in which you work day to day</a:t>
+            </a:r>
           </a:p>
           <a:p>
             <a:pPr>
@@ -6657,17 +6351,7 @@
                 <a:latin typeface="Segoe UI" panose="020B0502040204020203" pitchFamily="34" charset="0"/>
                 <a:cs typeface="Segoe UI" panose="020B0502040204020203" pitchFamily="34" charset="0"/>
               </a:rPr>
-              <a:t>Provide a basis for making </a:t>
-            </a:r>
-            <a:r>
-              <a:rPr lang="en-GB" sz="2000" dirty="0" smtClean="0">
-                <a:solidFill>
-                  <a:schemeClr val="tx2"/>
-                </a:solidFill>
-                <a:latin typeface="Segoe UI" panose="020B0502040204020203" pitchFamily="34" charset="0"/>
-                <a:cs typeface="Segoe UI" panose="020B0502040204020203" pitchFamily="34" charset="0"/>
-              </a:rPr>
-              <a:t>decisions</a:t>
+              <a:t>Provide a basis for making decisions</a:t>
             </a:r>
             <a:endParaRPr lang="en-GB" altLang="en-US" sz="2000" dirty="0">
               <a:solidFill>
@@ -6898,7 +6582,7 @@
           </a:lstStyle>
           <a:p>
             <a:r>
-              <a:rPr lang="en-GB" sz="4000" dirty="0" smtClean="0">
+              <a:rPr lang="en-GB" sz="4000" dirty="0">
                 <a:solidFill>
                   <a:schemeClr val="tx2"/>
                 </a:solidFill>
@@ -6907,13 +6591,6 @@
               </a:rPr>
               <a:t>Organisational values are…</a:t>
             </a:r>
-            <a:endParaRPr lang="en-GB" sz="4000" dirty="0">
-              <a:solidFill>
-                <a:schemeClr val="tx2"/>
-              </a:solidFill>
-              <a:latin typeface="Segoe UI" panose="020B0502040204020203" pitchFamily="34" charset="0"/>
-              <a:cs typeface="Segoe UI" panose="020B0502040204020203" pitchFamily="34" charset="0"/>
-            </a:endParaRPr>
           </a:p>
         </p:txBody>
       </p:sp>
@@ -6927,21 +6604,6 @@
   <p:clrMapOvr>
     <a:masterClrMapping/>
   </p:clrMapOvr>
-  <mc:AlternateContent xmlns:mc="http://schemas.openxmlformats.org/markup-compatibility/2006" xmlns:p14="http://schemas.microsoft.com/office/powerpoint/2010/main">
-    <mc:Choice Requires="p14">
-      <p:transition spd="slow" p14:dur="2000"/>
-    </mc:Choice>
-    <mc:Fallback xmlns="">
-      <p:transition spd="slow"/>
-    </mc:Fallback>
-  </mc:AlternateContent>
-  <p:timing>
-    <p:tnLst>
-      <p:par>
-        <p:cTn id="1" dur="indefinite" restart="never" nodeType="tmRoot"/>
-      </p:par>
-    </p:tnLst>
-  </p:timing>
 </p:sld>
 </file>
 
@@ -6985,7 +6647,7 @@
           <a:lstStyle/>
           <a:p>
             <a:r>
-              <a:rPr lang="en-GB" sz="4000" dirty="0" smtClean="0">
+              <a:rPr lang="en-GB" sz="4000" dirty="0">
                 <a:solidFill>
                   <a:schemeClr val="bg2">
                     <a:lumMod val="75000"/>
@@ -6997,7 +6659,7 @@
               <a:t>Activity: </a:t>
             </a:r>
             <a:r>
-              <a:rPr lang="en-GB" sz="4000" dirty="0" smtClean="0">
+              <a:rPr lang="en-GB" sz="4000" dirty="0">
                 <a:solidFill>
                   <a:schemeClr val="tx2"/>
                 </a:solidFill>
@@ -7006,13 +6668,6 @@
               </a:rPr>
               <a:t>Profiling</a:t>
             </a:r>
-            <a:endParaRPr lang="en-GB" sz="4000" dirty="0">
-              <a:solidFill>
-                <a:schemeClr val="tx2"/>
-              </a:solidFill>
-              <a:latin typeface="Segoe UI" panose="020B0502040204020203" pitchFamily="34" charset="0"/>
-              <a:cs typeface="Segoe UI" panose="020B0502040204020203" pitchFamily="34" charset="0"/>
-            </a:endParaRPr>
           </a:p>
         </p:txBody>
       </p:sp>
@@ -7037,186 +6692,6 @@
             <a:noAutofit/>
           </a:bodyPr>
           <a:lstStyle/>
-          <a:p>
-            <a:pPr marL="342900" indent="-342900" algn="just">
-              <a:lnSpc>
-                <a:spcPct val="150000"/>
-              </a:lnSpc>
-              <a:buFont typeface="+mj-lt"/>
-              <a:buAutoNum type="arabicPeriod"/>
-            </a:pPr>
-            <a:endParaRPr lang="en-GB" sz="2000" dirty="0" smtClean="0">
-              <a:solidFill>
-                <a:schemeClr val="tx2"/>
-              </a:solidFill>
-              <a:latin typeface="Segoe UI" panose="020B0502040204020203" pitchFamily="34" charset="0"/>
-              <a:cs typeface="Segoe UI" panose="020B0502040204020203" pitchFamily="34" charset="0"/>
-            </a:endParaRPr>
-          </a:p>
-          <a:p>
-            <a:pPr marL="342900" indent="-342900" algn="just">
-              <a:lnSpc>
-                <a:spcPct val="150000"/>
-              </a:lnSpc>
-              <a:buFont typeface="+mj-lt"/>
-              <a:buAutoNum type="arabicPeriod"/>
-            </a:pPr>
-            <a:r>
-              <a:rPr lang="en-GB" sz="2000" dirty="0" smtClean="0">
-                <a:solidFill>
-                  <a:schemeClr val="tx2"/>
-                </a:solidFill>
-                <a:latin typeface="Segoe UI" panose="020B0502040204020203" pitchFamily="34" charset="0"/>
-                <a:cs typeface="Segoe UI" panose="020B0502040204020203" pitchFamily="34" charset="0"/>
-              </a:rPr>
-              <a:t>Each corner indicated by the facilitator </a:t>
-            </a:r>
-            <a:r>
-              <a:rPr lang="en-GB" sz="2000" dirty="0">
-                <a:solidFill>
-                  <a:schemeClr val="tx2"/>
-                </a:solidFill>
-                <a:latin typeface="Segoe UI" panose="020B0502040204020203" pitchFamily="34" charset="0"/>
-                <a:cs typeface="Segoe UI" panose="020B0502040204020203" pitchFamily="34" charset="0"/>
-              </a:rPr>
-              <a:t>corresponds to one of four profiles, which </a:t>
-            </a:r>
-            <a:r>
-              <a:rPr lang="en-GB" sz="2000" dirty="0" smtClean="0">
-                <a:solidFill>
-                  <a:schemeClr val="tx2"/>
-                </a:solidFill>
-                <a:latin typeface="Segoe UI" panose="020B0502040204020203" pitchFamily="34" charset="0"/>
-                <a:cs typeface="Segoe UI" panose="020B0502040204020203" pitchFamily="34" charset="0"/>
-              </a:rPr>
-              <a:t>will be </a:t>
-            </a:r>
-            <a:r>
-              <a:rPr lang="en-GB" sz="2000" dirty="0">
-                <a:solidFill>
-                  <a:schemeClr val="tx2"/>
-                </a:solidFill>
-                <a:latin typeface="Segoe UI" panose="020B0502040204020203" pitchFamily="34" charset="0"/>
-                <a:cs typeface="Segoe UI" panose="020B0502040204020203" pitchFamily="34" charset="0"/>
-              </a:rPr>
-              <a:t>read </a:t>
-            </a:r>
-            <a:r>
-              <a:rPr lang="en-GB" sz="2000" dirty="0" smtClean="0">
-                <a:solidFill>
-                  <a:schemeClr val="tx2"/>
-                </a:solidFill>
-                <a:latin typeface="Segoe UI" panose="020B0502040204020203" pitchFamily="34" charset="0"/>
-                <a:cs typeface="Segoe UI" panose="020B0502040204020203" pitchFamily="34" charset="0"/>
-              </a:rPr>
-              <a:t>out</a:t>
-            </a:r>
-          </a:p>
-          <a:p>
-            <a:pPr marL="342900" indent="-342900" algn="just">
-              <a:lnSpc>
-                <a:spcPct val="150000"/>
-              </a:lnSpc>
-              <a:buFont typeface="+mj-lt"/>
-              <a:buAutoNum type="arabicPeriod"/>
-            </a:pPr>
-            <a:endParaRPr lang="en-GB" sz="2000" dirty="0" smtClean="0">
-              <a:solidFill>
-                <a:schemeClr val="tx2"/>
-              </a:solidFill>
-              <a:latin typeface="Segoe UI" panose="020B0502040204020203" pitchFamily="34" charset="0"/>
-              <a:cs typeface="Segoe UI" panose="020B0502040204020203" pitchFamily="34" charset="0"/>
-            </a:endParaRPr>
-          </a:p>
-          <a:p>
-            <a:pPr marL="342900" indent="-342900" algn="just">
-              <a:lnSpc>
-                <a:spcPct val="150000"/>
-              </a:lnSpc>
-              <a:buFont typeface="+mj-lt"/>
-              <a:buAutoNum type="arabicPeriod"/>
-            </a:pPr>
-            <a:r>
-              <a:rPr lang="en-GB" sz="2000" dirty="0">
-                <a:solidFill>
-                  <a:schemeClr val="tx2"/>
-                </a:solidFill>
-                <a:latin typeface="Segoe UI" panose="020B0502040204020203" pitchFamily="34" charset="0"/>
-                <a:cs typeface="Segoe UI" panose="020B0502040204020203" pitchFamily="34" charset="0"/>
-              </a:rPr>
-              <a:t>P</a:t>
-            </a:r>
-            <a:r>
-              <a:rPr lang="en-GB" sz="2000" dirty="0" smtClean="0">
-                <a:solidFill>
-                  <a:schemeClr val="tx2"/>
-                </a:solidFill>
-                <a:latin typeface="Segoe UI" panose="020B0502040204020203" pitchFamily="34" charset="0"/>
-                <a:cs typeface="Segoe UI" panose="020B0502040204020203" pitchFamily="34" charset="0"/>
-              </a:rPr>
-              <a:t>articipants should </a:t>
-            </a:r>
-            <a:r>
-              <a:rPr lang="en-GB" sz="2000" dirty="0">
-                <a:solidFill>
-                  <a:schemeClr val="tx2"/>
-                </a:solidFill>
-                <a:latin typeface="Segoe UI" panose="020B0502040204020203" pitchFamily="34" charset="0"/>
-                <a:cs typeface="Segoe UI" panose="020B0502040204020203" pitchFamily="34" charset="0"/>
-              </a:rPr>
-              <a:t>move </a:t>
-            </a:r>
-            <a:r>
-              <a:rPr lang="en-GB" sz="2000" dirty="0" smtClean="0">
-                <a:solidFill>
-                  <a:schemeClr val="tx2"/>
-                </a:solidFill>
-                <a:latin typeface="Segoe UI" panose="020B0502040204020203" pitchFamily="34" charset="0"/>
-                <a:cs typeface="Segoe UI" panose="020B0502040204020203" pitchFamily="34" charset="0"/>
-              </a:rPr>
-              <a:t>towards </a:t>
-            </a:r>
-            <a:r>
-              <a:rPr lang="en-GB" sz="2000" dirty="0">
-                <a:solidFill>
-                  <a:schemeClr val="tx2"/>
-                </a:solidFill>
-                <a:latin typeface="Segoe UI" panose="020B0502040204020203" pitchFamily="34" charset="0"/>
-                <a:cs typeface="Segoe UI" panose="020B0502040204020203" pitchFamily="34" charset="0"/>
-              </a:rPr>
-              <a:t>the </a:t>
-            </a:r>
-            <a:r>
-              <a:rPr lang="en-GB" sz="2000" dirty="0" smtClean="0">
-                <a:solidFill>
-                  <a:schemeClr val="tx2"/>
-                </a:solidFill>
-                <a:latin typeface="Segoe UI" panose="020B0502040204020203" pitchFamily="34" charset="0"/>
-                <a:cs typeface="Segoe UI" panose="020B0502040204020203" pitchFamily="34" charset="0"/>
-              </a:rPr>
-              <a:t>corner corresponding to the profile </a:t>
-            </a:r>
-            <a:r>
-              <a:rPr lang="en-GB" sz="2000" dirty="0">
-                <a:solidFill>
-                  <a:schemeClr val="tx2"/>
-                </a:solidFill>
-                <a:latin typeface="Segoe UI" panose="020B0502040204020203" pitchFamily="34" charset="0"/>
-                <a:cs typeface="Segoe UI" panose="020B0502040204020203" pitchFamily="34" charset="0"/>
-              </a:rPr>
-              <a:t>that resonates the most with </a:t>
-            </a:r>
-            <a:r>
-              <a:rPr lang="en-GB" sz="2000" dirty="0" smtClean="0">
-                <a:solidFill>
-                  <a:schemeClr val="tx2"/>
-                </a:solidFill>
-                <a:latin typeface="Segoe UI" panose="020B0502040204020203" pitchFamily="34" charset="0"/>
-                <a:cs typeface="Segoe UI" panose="020B0502040204020203" pitchFamily="34" charset="0"/>
-              </a:rPr>
-              <a:t>them</a:t>
-            </a:r>
-          </a:p>
           <a:p>
             <a:pPr marL="342900" indent="-342900" algn="just">
               <a:lnSpc>
@@ -7234,42 +6709,32 @@
             </a:endParaRPr>
           </a:p>
           <a:p>
-            <a:pPr marL="0" indent="0" algn="ctr">
+            <a:pPr marL="342900" indent="-342900" algn="just">
               <a:lnSpc>
                 <a:spcPct val="150000"/>
               </a:lnSpc>
-              <a:buNone/>
+              <a:buFont typeface="+mj-lt"/>
+              <a:buAutoNum type="arabicPeriod"/>
             </a:pPr>
             <a:r>
-              <a:rPr lang="en-GB" sz="2000" dirty="0" smtClean="0">
+              <a:rPr lang="en-GB" sz="2000" dirty="0">
                 <a:solidFill>
                   <a:schemeClr val="tx2"/>
                 </a:solidFill>
                 <a:latin typeface="Segoe UI" panose="020B0502040204020203" pitchFamily="34" charset="0"/>
                 <a:cs typeface="Segoe UI" panose="020B0502040204020203" pitchFamily="34" charset="0"/>
               </a:rPr>
-              <a:t>Staying </a:t>
-            </a:r>
-            <a:r>
-              <a:rPr lang="en-GB" sz="2000" dirty="0">
-                <a:solidFill>
-                  <a:schemeClr val="tx2"/>
-                </a:solidFill>
-                <a:latin typeface="Segoe UI" panose="020B0502040204020203" pitchFamily="34" charset="0"/>
-                <a:cs typeface="Segoe UI" panose="020B0502040204020203" pitchFamily="34" charset="0"/>
-              </a:rPr>
-              <a:t>in the middle is not </a:t>
-            </a:r>
-            <a:r>
-              <a:rPr lang="en-GB" sz="2000" dirty="0" smtClean="0">
-                <a:solidFill>
-                  <a:schemeClr val="tx2"/>
-                </a:solidFill>
-                <a:latin typeface="Segoe UI" panose="020B0502040204020203" pitchFamily="34" charset="0"/>
-                <a:cs typeface="Segoe UI" panose="020B0502040204020203" pitchFamily="34" charset="0"/>
-              </a:rPr>
-              <a:t>allowed!</a:t>
-            </a:r>
+              <a:t>Each corner indicated by the facilitator corresponds to one of four profiles, which will be read out</a:t>
+            </a:r>
+          </a:p>
+          <a:p>
+            <a:pPr marL="342900" indent="-342900" algn="just">
+              <a:lnSpc>
+                <a:spcPct val="150000"/>
+              </a:lnSpc>
+              <a:buFont typeface="+mj-lt"/>
+              <a:buAutoNum type="arabicPeriod"/>
+            </a:pPr>
             <a:endParaRPr lang="en-GB" sz="2000" dirty="0">
               <a:solidFill>
                 <a:schemeClr val="tx2"/>
@@ -7286,7 +6751,60 @@
               <a:buFont typeface="+mj-lt"/>
               <a:buAutoNum type="arabicPeriod"/>
             </a:pPr>
-            <a:endParaRPr lang="en-GB" sz="2000" dirty="0" smtClean="0">
+            <a:r>
+              <a:rPr lang="en-GB" sz="2000" dirty="0">
+                <a:solidFill>
+                  <a:schemeClr val="tx2"/>
+                </a:solidFill>
+                <a:latin typeface="Segoe UI" panose="020B0502040204020203" pitchFamily="34" charset="0"/>
+                <a:cs typeface="Segoe UI" panose="020B0502040204020203" pitchFamily="34" charset="0"/>
+              </a:rPr>
+              <a:t>Participants should move towards the corner corresponding to the profile that resonates the most with them</a:t>
+            </a:r>
+          </a:p>
+          <a:p>
+            <a:pPr marL="342900" indent="-342900" algn="just">
+              <a:lnSpc>
+                <a:spcPct val="150000"/>
+              </a:lnSpc>
+              <a:buFont typeface="+mj-lt"/>
+              <a:buAutoNum type="arabicPeriod"/>
+            </a:pPr>
+            <a:endParaRPr lang="en-GB" sz="2000" dirty="0">
+              <a:solidFill>
+                <a:schemeClr val="tx2"/>
+              </a:solidFill>
+              <a:latin typeface="Segoe UI" panose="020B0502040204020203" pitchFamily="34" charset="0"/>
+              <a:cs typeface="Segoe UI" panose="020B0502040204020203" pitchFamily="34" charset="0"/>
+            </a:endParaRPr>
+          </a:p>
+          <a:p>
+            <a:pPr marL="0" indent="0" algn="ctr">
+              <a:lnSpc>
+                <a:spcPct val="150000"/>
+              </a:lnSpc>
+              <a:buNone/>
+            </a:pPr>
+            <a:r>
+              <a:rPr lang="en-GB" sz="2000" dirty="0">
+                <a:solidFill>
+                  <a:schemeClr val="tx2"/>
+                </a:solidFill>
+                <a:latin typeface="Segoe UI" panose="020B0502040204020203" pitchFamily="34" charset="0"/>
+                <a:cs typeface="Segoe UI" panose="020B0502040204020203" pitchFamily="34" charset="0"/>
+              </a:rPr>
+              <a:t>Staying in the middle is not allowed!</a:t>
+            </a:r>
+          </a:p>
+          <a:p>
+            <a:pPr marL="342900" indent="-342900" algn="just">
+              <a:lnSpc>
+                <a:spcPct val="150000"/>
+              </a:lnSpc>
+              <a:buFont typeface="+mj-lt"/>
+              <a:buAutoNum type="arabicPeriod"/>
+            </a:pPr>
+            <a:endParaRPr lang="en-GB" sz="2000" dirty="0">
               <a:solidFill>
                 <a:schemeClr val="tx2"/>
               </a:solidFill>
@@ -7306,13 +6824,6 @@
   <p:clrMapOvr>
     <a:masterClrMapping/>
   </p:clrMapOvr>
-  <p:timing>
-    <p:tnLst>
-      <p:par>
-        <p:cTn id="1" dur="indefinite" restart="never" nodeType="tmRoot"/>
-      </p:par>
-    </p:tnLst>
-  </p:timing>
 </p:sld>
 </file>
 
@@ -7371,44 +6882,14 @@
               <a:buAutoNum type="arabicPeriod"/>
             </a:pPr>
             <a:r>
-              <a:rPr lang="en-GB" altLang="en-US" sz="2000" dirty="0" smtClean="0">
+              <a:rPr lang="en-GB" altLang="en-US" sz="2000" dirty="0">
                 <a:solidFill>
                   <a:schemeClr val="tx2"/>
                 </a:solidFill>
                 <a:latin typeface="Segoe UI" panose="020B0502040204020203" pitchFamily="34" charset="0"/>
                 <a:cs typeface="Segoe UI" panose="020B0502040204020203" pitchFamily="34" charset="0"/>
               </a:rPr>
-              <a:t>Based on the previous discussion, think </a:t>
-            </a:r>
-            <a:r>
-              <a:rPr lang="en-GB" altLang="en-US" sz="2000" dirty="0">
-                <a:solidFill>
-                  <a:schemeClr val="tx2"/>
-                </a:solidFill>
-                <a:latin typeface="Segoe UI" panose="020B0502040204020203" pitchFamily="34" charset="0"/>
-                <a:cs typeface="Segoe UI" panose="020B0502040204020203" pitchFamily="34" charset="0"/>
-              </a:rPr>
-              <a:t>about the values you think should guide your work in contributing to </a:t>
-            </a:r>
-            <a:r>
-              <a:rPr lang="en-GB" altLang="en-US" sz="2000" dirty="0" smtClean="0">
-                <a:solidFill>
-                  <a:schemeClr val="tx2"/>
-                </a:solidFill>
-                <a:latin typeface="Segoe UI" panose="020B0502040204020203" pitchFamily="34" charset="0"/>
-                <a:cs typeface="Segoe UI" panose="020B0502040204020203" pitchFamily="34" charset="0"/>
-              </a:rPr>
-              <a:t>your organisation’s </a:t>
-            </a:r>
-            <a:r>
-              <a:rPr lang="en-GB" altLang="en-US" sz="2000" dirty="0">
-                <a:solidFill>
-                  <a:schemeClr val="tx2"/>
-                </a:solidFill>
-                <a:latin typeface="Segoe UI" panose="020B0502040204020203" pitchFamily="34" charset="0"/>
-                <a:cs typeface="Segoe UI" panose="020B0502040204020203" pitchFamily="34" charset="0"/>
-              </a:rPr>
-              <a:t>vision, and your behaviour, approaches or ethos in doing so</a:t>
+              <a:t>Based on the previous discussion, think about the values you think should guide your work in contributing to your organisation’s vision, and your behaviour, approaches or ethos in doing so</a:t>
             </a:r>
             <a:endParaRPr lang="en-GB" altLang="en-US" sz="2000" b="1" dirty="0">
               <a:solidFill>
@@ -7466,7 +6947,7 @@
               </a:lnSpc>
               <a:buNone/>
             </a:pPr>
-            <a:endParaRPr lang="en-GB" altLang="en-US" dirty="0" smtClean="0">
+            <a:endParaRPr lang="en-GB" altLang="en-US" dirty="0">
               <a:solidFill>
                 <a:schemeClr val="tx2"/>
               </a:solidFill>
@@ -7481,7 +6962,7 @@
               </a:lnSpc>
               <a:buNone/>
             </a:pPr>
-            <a:endParaRPr lang="en-GB" altLang="en-US" dirty="0" smtClean="0">
+            <a:endParaRPr lang="en-GB" altLang="en-US" dirty="0">
               <a:solidFill>
                 <a:schemeClr val="tx2"/>
               </a:solidFill>
@@ -7493,7 +6974,7 @@
             <a:pPr marL="457200" indent="-457200">
               <a:buNone/>
             </a:pPr>
-            <a:endParaRPr lang="en-GB" altLang="en-US" dirty="0" smtClean="0">
+            <a:endParaRPr lang="en-GB" altLang="en-US" dirty="0">
               <a:solidFill>
                 <a:schemeClr val="tx2"/>
               </a:solidFill>
@@ -7591,7 +7072,7 @@
           </a:lstStyle>
           <a:p>
             <a:r>
-              <a:rPr lang="en-GB" sz="4000" dirty="0" smtClean="0">
+              <a:rPr lang="en-GB" sz="4000" dirty="0">
                 <a:solidFill>
                   <a:schemeClr val="bg2">
                     <a:lumMod val="75000"/>
@@ -7603,7 +7084,7 @@
               <a:t>Activity: </a:t>
             </a:r>
             <a:r>
-              <a:rPr lang="en-GB" sz="4000" dirty="0" smtClean="0">
+              <a:rPr lang="en-GB" sz="4000" dirty="0">
                 <a:solidFill>
                   <a:schemeClr val="tx2"/>
                 </a:solidFill>
@@ -7612,13 +7093,6 @@
               </a:rPr>
               <a:t>Defining values</a:t>
             </a:r>
-            <a:endParaRPr lang="en-GB" sz="4000" dirty="0">
-              <a:solidFill>
-                <a:schemeClr val="tx2"/>
-              </a:solidFill>
-              <a:latin typeface="Segoe UI" panose="020B0502040204020203" pitchFamily="34" charset="0"/>
-              <a:cs typeface="Segoe UI" panose="020B0502040204020203" pitchFamily="34" charset="0"/>
-            </a:endParaRPr>
           </a:p>
         </p:txBody>
       </p:sp>
@@ -7632,14 +7106,6 @@
   <p:clrMapOvr>
     <a:masterClrMapping/>
   </p:clrMapOvr>
-  <mc:AlternateContent xmlns:mc="http://schemas.openxmlformats.org/markup-compatibility/2006" xmlns:p14="http://schemas.microsoft.com/office/powerpoint/2010/main">
-    <mc:Choice Requires="p14">
-      <p:transition spd="slow" p14:dur="2000"/>
-    </mc:Choice>
-    <mc:Fallback xmlns="">
-      <p:transition spd="slow"/>
-    </mc:Fallback>
-  </mc:AlternateContent>
   <p:timing>
     <p:tnLst>
       <p:par>
@@ -7831,17 +7297,7 @@
                 <a:latin typeface="Segoe UI" panose="020B0502040204020203" pitchFamily="34" charset="0"/>
                 <a:cs typeface="Segoe UI" panose="020B0502040204020203" pitchFamily="34" charset="0"/>
               </a:rPr>
-              <a:t>. Your role in achieving that vision</a:t>
-            </a:r>
-            <a:r>
-              <a:rPr lang="en-GB" sz="1800" dirty="0" smtClean="0">
-                <a:solidFill>
-                  <a:schemeClr val="tx2"/>
-                </a:solidFill>
-                <a:latin typeface="Segoe UI" panose="020B0502040204020203" pitchFamily="34" charset="0"/>
-                <a:cs typeface="Segoe UI" panose="020B0502040204020203" pitchFamily="34" charset="0"/>
-              </a:rPr>
-              <a:t>.</a:t>
+              <a:t>. Your role in achieving that vision.</a:t>
             </a:r>
             <a:endParaRPr lang="en-GB" sz="1050" dirty="0">
               <a:solidFill>
@@ -7868,17 +7324,7 @@
                 <a:latin typeface="Segoe UI" panose="020B0502040204020203" pitchFamily="34" charset="0"/>
                 <a:cs typeface="Segoe UI" panose="020B0502040204020203" pitchFamily="34" charset="0"/>
               </a:rPr>
-              <a:t>Describes what the organisation does, with whom or for whom it does it, and </a:t>
-            </a:r>
-            <a:r>
-              <a:rPr lang="en-GB" sz="1800" dirty="0" smtClean="0">
-                <a:solidFill>
-                  <a:schemeClr val="tx2"/>
-                </a:solidFill>
-                <a:latin typeface="Segoe UI" panose="020B0502040204020203" pitchFamily="34" charset="0"/>
-                <a:cs typeface="Segoe UI" panose="020B0502040204020203" pitchFamily="34" charset="0"/>
-              </a:rPr>
-              <a:t>how</a:t>
+              <a:t>Describes what the organisation does, with whom or for whom it does it, and how</a:t>
             </a:r>
             <a:endParaRPr lang="en-GB" sz="1050" dirty="0">
               <a:solidFill>
@@ -7985,17 +7431,7 @@
                 <a:latin typeface="Segoe UI" panose="020B0502040204020203" pitchFamily="34" charset="0"/>
                 <a:cs typeface="Segoe UI" panose="020B0502040204020203" pitchFamily="34" charset="0"/>
               </a:rPr>
-              <a:t>i.e. We are……..We aim to…….We do this by</a:t>
-            </a:r>
-            <a:r>
-              <a:rPr lang="en-GB" sz="1600" dirty="0" smtClean="0">
-                <a:solidFill>
-                  <a:schemeClr val="tx2"/>
-                </a:solidFill>
-                <a:latin typeface="Segoe UI" panose="020B0502040204020203" pitchFamily="34" charset="0"/>
-                <a:cs typeface="Segoe UI" panose="020B0502040204020203" pitchFamily="34" charset="0"/>
-              </a:rPr>
-              <a:t>……</a:t>
+              <a:t>i.e. We are……..We aim to…….We do this by……</a:t>
             </a:r>
             <a:endParaRPr lang="en-GB" sz="1050" dirty="0">
               <a:solidFill>
@@ -8073,7 +7509,7 @@
               <a:buNone/>
               <a:defRPr/>
             </a:pPr>
-            <a:endParaRPr lang="en-GB" sz="500" dirty="0" smtClean="0">
+            <a:endParaRPr lang="en-GB" sz="500" dirty="0">
               <a:solidFill>
                 <a:schemeClr val="tx2"/>
               </a:solidFill>
@@ -8089,7 +7525,7 @@
               <a:buNone/>
               <a:defRPr/>
             </a:pPr>
-            <a:endParaRPr lang="en-GB" sz="500" dirty="0" smtClean="0">
+            <a:endParaRPr lang="en-GB" sz="500" dirty="0">
               <a:solidFill>
                 <a:schemeClr val="tx2"/>
               </a:solidFill>
@@ -8187,7 +7623,7 @@
           </a:lstStyle>
           <a:p>
             <a:r>
-              <a:rPr lang="en-GB" sz="4000" dirty="0" smtClean="0">
+              <a:rPr lang="en-GB" sz="4000" dirty="0">
                 <a:solidFill>
                   <a:schemeClr val="tx2"/>
                 </a:solidFill>
@@ -8196,13 +7632,6 @@
               </a:rPr>
               <a:t>A mission statement</a:t>
             </a:r>
-            <a:endParaRPr lang="en-GB" sz="4000" dirty="0">
-              <a:solidFill>
-                <a:schemeClr val="tx2"/>
-              </a:solidFill>
-              <a:latin typeface="Segoe UI" panose="020B0502040204020203" pitchFamily="34" charset="0"/>
-              <a:cs typeface="Segoe UI" panose="020B0502040204020203" pitchFamily="34" charset="0"/>
-            </a:endParaRPr>
           </a:p>
         </p:txBody>
       </p:sp>
@@ -8216,13 +7645,6 @@
   <p:clrMapOvr>
     <a:masterClrMapping/>
   </p:clrMapOvr>
-  <p:timing>
-    <p:tnLst>
-      <p:par>
-        <p:cTn id="1" dur="indefinite" restart="never" nodeType="tmRoot"/>
-      </p:par>
-    </p:tnLst>
-  </p:timing>
 </p:sld>
 </file>
 
@@ -8530,7 +7952,7 @@
           </a:lstStyle>
           <a:p>
             <a:r>
-              <a:rPr lang="en-GB" sz="4000" dirty="0" smtClean="0">
+              <a:rPr lang="en-GB" sz="4000" dirty="0">
                 <a:solidFill>
                   <a:schemeClr val="bg2">
                     <a:lumMod val="75000"/>
@@ -8549,25 +7971,8 @@
                 <a:latin typeface="Segoe UI" panose="020B0502040204020203" pitchFamily="34" charset="0"/>
                 <a:cs typeface="Segoe UI" panose="020B0502040204020203" pitchFamily="34" charset="0"/>
               </a:rPr>
-              <a:t>A</a:t>
-            </a:r>
-            <a:r>
-              <a:rPr lang="en-GB" sz="4000" dirty="0" smtClean="0">
-                <a:solidFill>
-                  <a:schemeClr val="tx2"/>
-                </a:solidFill>
-                <a:latin typeface="Segoe UI" panose="020B0502040204020203" pitchFamily="34" charset="0"/>
-                <a:cs typeface="Segoe UI" panose="020B0502040204020203" pitchFamily="34" charset="0"/>
-              </a:rPr>
-              <a:t> mission statement</a:t>
-            </a:r>
-            <a:endParaRPr lang="en-GB" sz="4000" dirty="0">
-              <a:solidFill>
-                <a:schemeClr val="tx2"/>
-              </a:solidFill>
-              <a:latin typeface="Segoe UI" panose="020B0502040204020203" pitchFamily="34" charset="0"/>
-              <a:cs typeface="Segoe UI" panose="020B0502040204020203" pitchFamily="34" charset="0"/>
-            </a:endParaRPr>
+              <a:t>A mission statement</a:t>
+            </a:r>
           </a:p>
         </p:txBody>
       </p:sp>
@@ -8581,13 +7986,6 @@
   <p:clrMapOvr>
     <a:masterClrMapping/>
   </p:clrMapOvr>
-  <p:timing>
-    <p:tnLst>
-      <p:par>
-        <p:cTn id="1" dur="indefinite" restart="never" nodeType="tmRoot"/>
-      </p:par>
-    </p:tnLst>
-  </p:timing>
 </p:sld>
 </file>
 
@@ -8921,7 +8319,7 @@
           </a:lstStyle>
           <a:p>
             <a:r>
-              <a:rPr lang="en-GB" sz="4000" dirty="0" smtClean="0">
+              <a:rPr lang="en-GB" sz="4000" dirty="0">
                 <a:solidFill>
                   <a:schemeClr val="bg2">
                     <a:lumMod val="75000"/>
@@ -8933,7 +8331,7 @@
               <a:t>Activity: </a:t>
             </a:r>
             <a:r>
-              <a:rPr lang="en-GB" sz="4000" dirty="0" smtClean="0">
+              <a:rPr lang="en-GB" sz="4000" dirty="0">
                 <a:solidFill>
                   <a:schemeClr val="tx2"/>
                 </a:solidFill>
@@ -8942,13 +8340,6 @@
               </a:rPr>
               <a:t>Defining a mission statement</a:t>
             </a:r>
-            <a:endParaRPr lang="en-GB" sz="4000" dirty="0">
-              <a:solidFill>
-                <a:schemeClr val="tx2"/>
-              </a:solidFill>
-              <a:latin typeface="Segoe UI" panose="020B0502040204020203" pitchFamily="34" charset="0"/>
-              <a:cs typeface="Segoe UI" panose="020B0502040204020203" pitchFamily="34" charset="0"/>
-            </a:endParaRPr>
           </a:p>
         </p:txBody>
       </p:sp>
@@ -8962,13 +8353,6 @@
   <p:clrMapOvr>
     <a:masterClrMapping/>
   </p:clrMapOvr>
-  <p:timing>
-    <p:tnLst>
-      <p:par>
-        <p:cTn id="1" dur="indefinite" restart="never" nodeType="tmRoot"/>
-      </p:par>
-    </p:tnLst>
-  </p:timing>
 </p:sld>
 </file>
 
@@ -9012,7 +8396,7 @@
           <a:lstStyle/>
           <a:p>
             <a:r>
-              <a:rPr lang="en-GB" sz="4000" dirty="0" smtClean="0">
+              <a:rPr lang="en-GB" sz="4000" dirty="0">
                 <a:solidFill>
                   <a:schemeClr val="tx2"/>
                 </a:solidFill>
@@ -9021,13 +8405,6 @@
               </a:rPr>
               <a:t>Corner 1</a:t>
             </a:r>
-            <a:endParaRPr lang="en-GB" sz="4000" dirty="0">
-              <a:solidFill>
-                <a:schemeClr val="tx2"/>
-              </a:solidFill>
-              <a:latin typeface="Segoe UI" panose="020B0502040204020203" pitchFamily="34" charset="0"/>
-              <a:cs typeface="Segoe UI" panose="020B0502040204020203" pitchFamily="34" charset="0"/>
-            </a:endParaRPr>
           </a:p>
         </p:txBody>
       </p:sp>
@@ -9059,32 +8436,15 @@
               </a:lnSpc>
             </a:pPr>
             <a:r>
-              <a:rPr lang="en-GB" sz="1800" i="1" dirty="0" smtClean="0">
+              <a:rPr lang="en-GB" sz="1800" i="1" dirty="0">
                 <a:solidFill>
                   <a:schemeClr val="tx2"/>
                 </a:solidFill>
                 <a:latin typeface="Segoe UI" panose="020B0502040204020203" pitchFamily="34" charset="0"/>
                 <a:cs typeface="Segoe UI" panose="020B0502040204020203" pitchFamily="34" charset="0"/>
               </a:rPr>
-              <a:t>Central </a:t>
-            </a:r>
-            <a:r>
-              <a:rPr lang="en-GB" sz="1800" i="1" dirty="0">
-                <a:solidFill>
-                  <a:schemeClr val="tx2"/>
-                </a:solidFill>
-                <a:latin typeface="Segoe UI" panose="020B0502040204020203" pitchFamily="34" charset="0"/>
-                <a:cs typeface="Segoe UI" panose="020B0502040204020203" pitchFamily="34" charset="0"/>
-              </a:rPr>
-              <a:t>to this position is a shift towards viewing conservation as being about protecting nature in order to improve human wellbeing (especially that of the poor), rather than for biodiversity’s own sake. </a:t>
-            </a:r>
-            <a:endParaRPr lang="en-GB" sz="1800" i="1" dirty="0" smtClean="0">
-              <a:solidFill>
-                <a:schemeClr val="tx2"/>
-              </a:solidFill>
-              <a:latin typeface="Segoe UI" panose="020B0502040204020203" pitchFamily="34" charset="0"/>
-              <a:cs typeface="Segoe UI" panose="020B0502040204020203" pitchFamily="34" charset="0"/>
-            </a:endParaRPr>
+              <a:t>Central to this position is a shift towards viewing conservation as being about protecting nature in order to improve human wellbeing (especially that of the poor), rather than for biodiversity’s own sake. </a:t>
+            </a:r>
           </a:p>
           <a:p>
             <a:pPr algn="just">
@@ -9093,32 +8453,15 @@
               </a:lnSpc>
             </a:pPr>
             <a:r>
-              <a:rPr lang="en-GB" sz="1800" i="1" dirty="0" smtClean="0">
+              <a:rPr lang="en-GB" sz="1800" i="1" dirty="0">
                 <a:solidFill>
                   <a:schemeClr val="tx2"/>
                 </a:solidFill>
                 <a:latin typeface="Segoe UI" panose="020B0502040204020203" pitchFamily="34" charset="0"/>
                 <a:cs typeface="Segoe UI" panose="020B0502040204020203" pitchFamily="34" charset="0"/>
               </a:rPr>
-              <a:t>You </a:t>
-            </a:r>
-            <a:r>
-              <a:rPr lang="en-GB" sz="1800" i="1" dirty="0">
-                <a:solidFill>
-                  <a:schemeClr val="tx2"/>
-                </a:solidFill>
-                <a:latin typeface="Segoe UI" panose="020B0502040204020203" pitchFamily="34" charset="0"/>
-                <a:cs typeface="Segoe UI" panose="020B0502040204020203" pitchFamily="34" charset="0"/>
-              </a:rPr>
-              <a:t>believe that win-win situations in which people benefit from conservation can often be achieved by promoting economic growth and partnering with corporations. </a:t>
-            </a:r>
-            <a:endParaRPr lang="en-GB" sz="1800" i="1" dirty="0" smtClean="0">
-              <a:solidFill>
-                <a:schemeClr val="tx2"/>
-              </a:solidFill>
-              <a:latin typeface="Segoe UI" panose="020B0502040204020203" pitchFamily="34" charset="0"/>
-              <a:cs typeface="Segoe UI" panose="020B0502040204020203" pitchFamily="34" charset="0"/>
-            </a:endParaRPr>
+              <a:t>You believe that win-win situations in which people benefit from conservation can often be achieved by promoting economic growth and partnering with corporations. </a:t>
+            </a:r>
           </a:p>
         </p:txBody>
       </p:sp>
@@ -9178,13 +8521,6 @@
   <p:clrMapOvr>
     <a:masterClrMapping/>
   </p:clrMapOvr>
-  <p:timing>
-    <p:tnLst>
-      <p:par>
-        <p:cTn id="1" dur="indefinite" restart="never" nodeType="tmRoot"/>
-      </p:par>
-    </p:tnLst>
-  </p:timing>
 </p:sld>
 </file>
 
@@ -9228,7 +8564,7 @@
           <a:lstStyle/>
           <a:p>
             <a:r>
-              <a:rPr lang="en-GB" sz="4000" dirty="0" smtClean="0">
+              <a:rPr lang="en-GB" sz="4000" dirty="0">
                 <a:solidFill>
                   <a:schemeClr val="tx2"/>
                 </a:solidFill>
@@ -9237,13 +8573,6 @@
               </a:rPr>
               <a:t>Corner 2</a:t>
             </a:r>
-            <a:endParaRPr lang="en-GB" sz="4000" dirty="0">
-              <a:solidFill>
-                <a:schemeClr val="tx2"/>
-              </a:solidFill>
-              <a:latin typeface="Segoe UI" panose="020B0502040204020203" pitchFamily="34" charset="0"/>
-              <a:cs typeface="Segoe UI" panose="020B0502040204020203" pitchFamily="34" charset="0"/>
-            </a:endParaRPr>
           </a:p>
         </p:txBody>
       </p:sp>
@@ -9282,47 +8611,7 @@
                 <a:latin typeface="Segoe UI" panose="020B0502040204020203" pitchFamily="34" charset="0"/>
                 <a:cs typeface="Segoe UI" panose="020B0502040204020203" pitchFamily="34" charset="0"/>
               </a:rPr>
-              <a:t>You </a:t>
-            </a:r>
-            <a:r>
-              <a:rPr lang="en-GB" sz="1800" i="1" dirty="0" smtClean="0">
-                <a:solidFill>
-                  <a:schemeClr val="tx2"/>
-                </a:solidFill>
-                <a:latin typeface="Segoe UI" panose="020B0502040204020203" pitchFamily="34" charset="0"/>
-                <a:cs typeface="Segoe UI" panose="020B0502040204020203" pitchFamily="34" charset="0"/>
-              </a:rPr>
-              <a:t>support </a:t>
-            </a:r>
-            <a:r>
-              <a:rPr lang="en-GB" sz="1800" i="1" dirty="0">
-                <a:solidFill>
-                  <a:schemeClr val="tx2"/>
-                </a:solidFill>
-                <a:latin typeface="Segoe UI" panose="020B0502040204020203" pitchFamily="34" charset="0"/>
-                <a:cs typeface="Segoe UI" panose="020B0502040204020203" pitchFamily="34" charset="0"/>
-              </a:rPr>
-              <a:t>the protection of nature for its own sake. </a:t>
-            </a:r>
-            <a:r>
-              <a:rPr lang="en-GB" sz="1800" i="1" dirty="0" smtClean="0">
-                <a:solidFill>
-                  <a:schemeClr val="tx2"/>
-                </a:solidFill>
-                <a:latin typeface="Segoe UI" panose="020B0502040204020203" pitchFamily="34" charset="0"/>
-                <a:cs typeface="Segoe UI" panose="020B0502040204020203" pitchFamily="34" charset="0"/>
-              </a:rPr>
-              <a:t>This </a:t>
-            </a:r>
-            <a:r>
-              <a:rPr lang="en-GB" sz="1800" i="1" dirty="0">
-                <a:solidFill>
-                  <a:schemeClr val="tx2"/>
-                </a:solidFill>
-                <a:latin typeface="Segoe UI" panose="020B0502040204020203" pitchFamily="34" charset="0"/>
-                <a:cs typeface="Segoe UI" panose="020B0502040204020203" pitchFamily="34" charset="0"/>
-              </a:rPr>
-              <a:t>emphasis on nature’s intrinsic value typically leads advocates of this stand to be critical of markets and economic growth as tools for conservation. </a:t>
+              <a:t>You support the protection of nature for its own sake. This emphasis on nature’s intrinsic value typically leads advocates of this stand to be critical of markets and economic growth as tools for conservation. </a:t>
             </a:r>
           </a:p>
           <a:p>
@@ -9332,32 +8621,15 @@
               </a:lnSpc>
             </a:pPr>
             <a:r>
-              <a:rPr lang="en-GB" sz="1800" i="1" dirty="0" smtClean="0">
+              <a:rPr lang="en-GB" sz="1800" i="1" dirty="0">
                 <a:solidFill>
                   <a:schemeClr val="tx2"/>
                 </a:solidFill>
                 <a:latin typeface="Segoe UI" panose="020B0502040204020203" pitchFamily="34" charset="0"/>
                 <a:cs typeface="Segoe UI" panose="020B0502040204020203" pitchFamily="34" charset="0"/>
               </a:rPr>
-              <a:t>You </a:t>
-            </a:r>
-            <a:r>
-              <a:rPr lang="en-GB" sz="1800" i="1" dirty="0">
-                <a:solidFill>
-                  <a:schemeClr val="tx2"/>
-                </a:solidFill>
-                <a:latin typeface="Segoe UI" panose="020B0502040204020203" pitchFamily="34" charset="0"/>
-                <a:cs typeface="Segoe UI" panose="020B0502040204020203" pitchFamily="34" charset="0"/>
-              </a:rPr>
-              <a:t>believe that by embracing markets, we run the risk of ‘selling out nature’ by neglecting species that may be considered to be of little economic value. </a:t>
-            </a:r>
-            <a:endParaRPr lang="en-GB" sz="1800" i="1" dirty="0" smtClean="0">
-              <a:solidFill>
-                <a:schemeClr val="tx2"/>
-              </a:solidFill>
-              <a:latin typeface="Segoe UI" panose="020B0502040204020203" pitchFamily="34" charset="0"/>
-              <a:cs typeface="Segoe UI" panose="020B0502040204020203" pitchFamily="34" charset="0"/>
-            </a:endParaRPr>
+              <a:t>You believe that by embracing markets, we run the risk of ‘selling out nature’ by neglecting species that may be considered to be of little economic value. </a:t>
+            </a:r>
           </a:p>
           <a:p>
             <a:pPr algn="just">
@@ -9366,32 +8638,15 @@
               </a:lnSpc>
             </a:pPr>
             <a:r>
-              <a:rPr lang="en-GB" sz="1800" i="1" dirty="0" smtClean="0">
+              <a:rPr lang="en-GB" sz="1800" i="1" dirty="0">
                 <a:solidFill>
                   <a:schemeClr val="tx2"/>
                 </a:solidFill>
                 <a:latin typeface="Segoe UI" panose="020B0502040204020203" pitchFamily="34" charset="0"/>
                 <a:cs typeface="Segoe UI" panose="020B0502040204020203" pitchFamily="34" charset="0"/>
               </a:rPr>
-              <a:t>Economic </a:t>
-            </a:r>
-            <a:r>
-              <a:rPr lang="en-GB" sz="1800" i="1" dirty="0">
-                <a:solidFill>
-                  <a:schemeClr val="tx2"/>
-                </a:solidFill>
-                <a:latin typeface="Segoe UI" panose="020B0502040204020203" pitchFamily="34" charset="0"/>
-                <a:cs typeface="Segoe UI" panose="020B0502040204020203" pitchFamily="34" charset="0"/>
-              </a:rPr>
-              <a:t>growth itself is seen as a major driver of threats to biodiversity. </a:t>
-            </a:r>
-            <a:endParaRPr lang="en-GB" sz="1800" i="1" dirty="0" smtClean="0">
-              <a:solidFill>
-                <a:schemeClr val="tx2"/>
-              </a:solidFill>
-              <a:latin typeface="Segoe UI" panose="020B0502040204020203" pitchFamily="34" charset="0"/>
-              <a:cs typeface="Segoe UI" panose="020B0502040204020203" pitchFamily="34" charset="0"/>
-            </a:endParaRPr>
+              <a:t>Economic growth itself is seen as a major driver of threats to biodiversity. </a:t>
+            </a:r>
           </a:p>
           <a:p>
             <a:pPr algn="just">
@@ -9400,42 +8655,15 @@
               </a:lnSpc>
             </a:pPr>
             <a:r>
-              <a:rPr lang="en-GB" sz="1800" i="1" dirty="0" smtClean="0">
+              <a:rPr lang="en-GB" sz="1800" i="1" dirty="0">
                 <a:solidFill>
                   <a:schemeClr val="tx2"/>
                 </a:solidFill>
                 <a:latin typeface="Segoe UI" panose="020B0502040204020203" pitchFamily="34" charset="0"/>
                 <a:cs typeface="Segoe UI" panose="020B0502040204020203" pitchFamily="34" charset="0"/>
               </a:rPr>
-              <a:t>You </a:t>
-            </a:r>
-            <a:r>
-              <a:rPr lang="en-GB" sz="1800" i="1" dirty="0">
-                <a:solidFill>
-                  <a:schemeClr val="tx2"/>
-                </a:solidFill>
-                <a:latin typeface="Segoe UI" panose="020B0502040204020203" pitchFamily="34" charset="0"/>
-                <a:cs typeface="Segoe UI" panose="020B0502040204020203" pitchFamily="34" charset="0"/>
-              </a:rPr>
-              <a:t>typically favour protected areas, particularly in ecosystems with relatively low human impacts, as a primary conservation strategy</a:t>
-            </a:r>
-            <a:r>
-              <a:rPr lang="en-GB" sz="1800" i="1" dirty="0" smtClean="0">
-                <a:solidFill>
-                  <a:schemeClr val="tx2"/>
-                </a:solidFill>
-                <a:latin typeface="Segoe UI" panose="020B0502040204020203" pitchFamily="34" charset="0"/>
-                <a:cs typeface="Segoe UI" panose="020B0502040204020203" pitchFamily="34" charset="0"/>
-              </a:rPr>
-              <a:t>.</a:t>
-            </a:r>
-            <a:endParaRPr lang="en-GB" sz="1800" i="1" dirty="0">
-              <a:solidFill>
-                <a:schemeClr val="tx2"/>
-              </a:solidFill>
-              <a:latin typeface="Segoe UI" panose="020B0502040204020203" pitchFamily="34" charset="0"/>
-              <a:cs typeface="Segoe UI" panose="020B0502040204020203" pitchFamily="34" charset="0"/>
-            </a:endParaRPr>
+              <a:t>You typically favour protected areas, particularly in ecosystems with relatively low human impacts, as a primary conservation strategy.</a:t>
+            </a:r>
           </a:p>
         </p:txBody>
       </p:sp>
@@ -9495,13 +8723,6 @@
   <p:clrMapOvr>
     <a:masterClrMapping/>
   </p:clrMapOvr>
-  <p:timing>
-    <p:tnLst>
-      <p:par>
-        <p:cTn id="1" dur="indefinite" restart="never" nodeType="tmRoot"/>
-      </p:par>
-    </p:tnLst>
-  </p:timing>
 </p:sld>
 </file>
 
@@ -9545,7 +8766,7 @@
           <a:lstStyle/>
           <a:p>
             <a:r>
-              <a:rPr lang="en-GB" sz="4000" dirty="0" smtClean="0">
+              <a:rPr lang="en-GB" sz="4000" dirty="0">
                 <a:solidFill>
                   <a:schemeClr val="tx2"/>
                 </a:solidFill>
@@ -9554,13 +8775,6 @@
               </a:rPr>
               <a:t>Corner 3</a:t>
             </a:r>
-            <a:endParaRPr lang="en-GB" sz="4000" dirty="0">
-              <a:solidFill>
-                <a:schemeClr val="tx2"/>
-              </a:solidFill>
-              <a:latin typeface="Segoe UI" panose="020B0502040204020203" pitchFamily="34" charset="0"/>
-              <a:cs typeface="Segoe UI" panose="020B0502040204020203" pitchFamily="34" charset="0"/>
-            </a:endParaRPr>
           </a:p>
         </p:txBody>
       </p:sp>
@@ -9599,17 +8813,7 @@
                 <a:latin typeface="Segoe UI" panose="020B0502040204020203" pitchFamily="34" charset="0"/>
                 <a:cs typeface="Segoe UI" panose="020B0502040204020203" pitchFamily="34" charset="0"/>
               </a:rPr>
-              <a:t>You support conservation based on nature’s intrinsic value along with a market-based approach</a:t>
-            </a:r>
-            <a:r>
-              <a:rPr lang="en-GB" sz="1800" i="1" dirty="0" smtClean="0">
-                <a:solidFill>
-                  <a:schemeClr val="tx2"/>
-                </a:solidFill>
-                <a:latin typeface="Segoe UI" panose="020B0502040204020203" pitchFamily="34" charset="0"/>
-                <a:cs typeface="Segoe UI" panose="020B0502040204020203" pitchFamily="34" charset="0"/>
-              </a:rPr>
-              <a:t>.</a:t>
+              <a:t>You support conservation based on nature’s intrinsic value along with a market-based approach.</a:t>
             </a:r>
           </a:p>
           <a:p>
@@ -9626,17 +8830,7 @@
                 <a:latin typeface="Segoe UI" panose="020B0502040204020203" pitchFamily="34" charset="0"/>
                 <a:cs typeface="Segoe UI" panose="020B0502040204020203" pitchFamily="34" charset="0"/>
               </a:rPr>
-              <a:t>You are less concerned about the role of people as participants and beneficiaries of conservation</a:t>
-            </a:r>
-            <a:r>
-              <a:rPr lang="en-GB" sz="1800" i="1" dirty="0" smtClean="0">
-                <a:solidFill>
-                  <a:schemeClr val="tx2"/>
-                </a:solidFill>
-                <a:latin typeface="Segoe UI" panose="020B0502040204020203" pitchFamily="34" charset="0"/>
-                <a:cs typeface="Segoe UI" panose="020B0502040204020203" pitchFamily="34" charset="0"/>
-              </a:rPr>
-              <a:t>.</a:t>
+              <a:t>You are less concerned about the role of people as participants and beneficiaries of conservation.</a:t>
             </a:r>
           </a:p>
           <a:p>
@@ -9646,7 +8840,7 @@
               </a:lnSpc>
             </a:pPr>
             <a:r>
-              <a:rPr lang="en-GB" sz="1800" i="1" dirty="0" smtClean="0">
+              <a:rPr lang="en-GB" sz="1800" i="1" dirty="0">
                 <a:solidFill>
                   <a:schemeClr val="tx2"/>
                 </a:solidFill>
@@ -9655,13 +8849,6 @@
               </a:rPr>
               <a:t>Perhaps one example of this approach is EO Wilson’s recent book ‘Half-Earth’, which advocates the setting aside of half of the Earth’s surface for nature reserves. Aware that this ambitious target would require a drastic decrease in per capita environmental footprint worldwide, Wilson supports free markets as a means to favour those products which generate the maximum profit for the minimum energy and resource consumption.  </a:t>
             </a:r>
-            <a:endParaRPr lang="en-GB" sz="1800" i="1" dirty="0">
-              <a:solidFill>
-                <a:schemeClr val="tx2"/>
-              </a:solidFill>
-              <a:latin typeface="Segoe UI" panose="020B0502040204020203" pitchFamily="34" charset="0"/>
-              <a:cs typeface="Segoe UI" panose="020B0502040204020203" pitchFamily="34" charset="0"/>
-            </a:endParaRPr>
           </a:p>
         </p:txBody>
       </p:sp>
@@ -9721,13 +8908,6 @@
   <p:clrMapOvr>
     <a:masterClrMapping/>
   </p:clrMapOvr>
-  <p:timing>
-    <p:tnLst>
-      <p:par>
-        <p:cTn id="1" dur="indefinite" restart="never" nodeType="tmRoot"/>
-      </p:par>
-    </p:tnLst>
-  </p:timing>
 </p:sld>
 </file>
 
@@ -9771,7 +8951,7 @@
           <a:lstStyle/>
           <a:p>
             <a:r>
-              <a:rPr lang="en-GB" sz="4000" dirty="0" smtClean="0">
+              <a:rPr lang="en-GB" sz="4000" dirty="0">
                 <a:solidFill>
                   <a:schemeClr val="tx2"/>
                 </a:solidFill>
@@ -9780,13 +8960,6 @@
               </a:rPr>
               <a:t>Corner 4</a:t>
             </a:r>
-            <a:endParaRPr lang="en-GB" sz="4000" dirty="0">
-              <a:solidFill>
-                <a:schemeClr val="tx2"/>
-              </a:solidFill>
-              <a:latin typeface="Segoe UI" panose="020B0502040204020203" pitchFamily="34" charset="0"/>
-              <a:cs typeface="Segoe UI" panose="020B0502040204020203" pitchFamily="34" charset="0"/>
-            </a:endParaRPr>
           </a:p>
         </p:txBody>
       </p:sp>
@@ -9827,13 +9000,6 @@
               </a:rPr>
               <a:t>For you, the impacts of conservation on human wellbeing should be at the forefront of the conservation debate. </a:t>
             </a:r>
-            <a:endParaRPr lang="en-GB" sz="1800" i="1" dirty="0" smtClean="0">
-              <a:solidFill>
-                <a:schemeClr val="tx2"/>
-              </a:solidFill>
-              <a:latin typeface="Segoe UI" panose="020B0502040204020203" pitchFamily="34" charset="0"/>
-              <a:cs typeface="Segoe UI" panose="020B0502040204020203" pitchFamily="34" charset="0"/>
-            </a:endParaRPr>
           </a:p>
           <a:p>
             <a:pPr algn="just">
@@ -9842,32 +9008,15 @@
               </a:lnSpc>
             </a:pPr>
             <a:r>
-              <a:rPr lang="en-GB" sz="1800" i="1" dirty="0" smtClean="0">
+              <a:rPr lang="en-GB" sz="1800" i="1" dirty="0">
                 <a:solidFill>
                   <a:schemeClr val="tx2"/>
                 </a:solidFill>
                 <a:latin typeface="Segoe UI" panose="020B0502040204020203" pitchFamily="34" charset="0"/>
                 <a:cs typeface="Segoe UI" panose="020B0502040204020203" pitchFamily="34" charset="0"/>
               </a:rPr>
-              <a:t>This </a:t>
-            </a:r>
-            <a:r>
-              <a:rPr lang="en-GB" sz="1800" i="1" dirty="0">
-                <a:solidFill>
-                  <a:schemeClr val="tx2"/>
-                </a:solidFill>
-                <a:latin typeface="Segoe UI" panose="020B0502040204020203" pitchFamily="34" charset="0"/>
-                <a:cs typeface="Segoe UI" panose="020B0502040204020203" pitchFamily="34" charset="0"/>
-              </a:rPr>
-              <a:t>entails both being critical of negative side-effects that conservation activities might have on people who are economically poor and/or politically marginalised, and also employing conservation initiatives as a means of improving human welfare. </a:t>
-            </a:r>
-            <a:endParaRPr lang="en-GB" sz="1800" i="1" dirty="0" smtClean="0">
-              <a:solidFill>
-                <a:schemeClr val="tx2"/>
-              </a:solidFill>
-              <a:latin typeface="Segoe UI" panose="020B0502040204020203" pitchFamily="34" charset="0"/>
-              <a:cs typeface="Segoe UI" panose="020B0502040204020203" pitchFamily="34" charset="0"/>
-            </a:endParaRPr>
+              <a:t>This entails both being critical of negative side-effects that conservation activities might have on people who are economically poor and/or politically marginalised, and also employing conservation initiatives as a means of improving human welfare. </a:t>
+            </a:r>
           </a:p>
           <a:p>
             <a:pPr algn="just">
@@ -9876,42 +9025,15 @@
               </a:lnSpc>
             </a:pPr>
             <a:r>
-              <a:rPr lang="en-GB" sz="1800" i="1" dirty="0" smtClean="0">
+              <a:rPr lang="en-GB" sz="1800" i="1" dirty="0">
                 <a:solidFill>
                   <a:schemeClr val="tx2"/>
                 </a:solidFill>
                 <a:latin typeface="Segoe UI" panose="020B0502040204020203" pitchFamily="34" charset="0"/>
                 <a:cs typeface="Segoe UI" panose="020B0502040204020203" pitchFamily="34" charset="0"/>
               </a:rPr>
-              <a:t>You tend </a:t>
-            </a:r>
-            <a:r>
-              <a:rPr lang="en-GB" sz="1800" i="1" dirty="0">
-                <a:solidFill>
-                  <a:schemeClr val="tx2"/>
-                </a:solidFill>
-                <a:latin typeface="Segoe UI" panose="020B0502040204020203" pitchFamily="34" charset="0"/>
-                <a:cs typeface="Segoe UI" panose="020B0502040204020203" pitchFamily="34" charset="0"/>
-              </a:rPr>
-              <a:t>to be sceptical of the ability of markets and capitalism to deliver benefits for both nature and people</a:t>
-            </a:r>
-            <a:r>
-              <a:rPr lang="en-GB" sz="1800" i="1" dirty="0" smtClean="0">
-                <a:solidFill>
-                  <a:schemeClr val="tx2"/>
-                </a:solidFill>
-                <a:latin typeface="Segoe UI" panose="020B0502040204020203" pitchFamily="34" charset="0"/>
-                <a:cs typeface="Segoe UI" panose="020B0502040204020203" pitchFamily="34" charset="0"/>
-              </a:rPr>
-              <a:t>.    </a:t>
-            </a:r>
-            <a:endParaRPr lang="en-GB" sz="1800" i="1" dirty="0">
-              <a:solidFill>
-                <a:schemeClr val="tx2"/>
-              </a:solidFill>
-              <a:latin typeface="Segoe UI" panose="020B0502040204020203" pitchFamily="34" charset="0"/>
-              <a:cs typeface="Segoe UI" panose="020B0502040204020203" pitchFamily="34" charset="0"/>
-            </a:endParaRPr>
+              <a:t>You tend to be sceptical of the ability of markets and capitalism to deliver benefits for both nature and people.    </a:t>
+            </a:r>
           </a:p>
         </p:txBody>
       </p:sp>
@@ -9971,13 +9093,6 @@
   <p:clrMapOvr>
     <a:masterClrMapping/>
   </p:clrMapOvr>
-  <p:timing>
-    <p:tnLst>
-      <p:par>
-        <p:cTn id="1" dur="indefinite" restart="never" nodeType="tmRoot"/>
-      </p:par>
-    </p:tnLst>
-  </p:timing>
 </p:sld>
 </file>
 
@@ -10096,15 +9211,7 @@
                   <a:schemeClr val="bg1"/>
                 </a:solidFill>
               </a:rPr>
-              <a:t>Corner </a:t>
-            </a:r>
-            <a:r>
-              <a:rPr lang="en-GB" sz="2000" dirty="0" smtClean="0">
-                <a:solidFill>
-                  <a:schemeClr val="bg1"/>
-                </a:solidFill>
-              </a:rPr>
-              <a:t>1</a:t>
+              <a:t>Corner 1</a:t>
             </a:r>
           </a:p>
           <a:p>
@@ -10114,20 +9221,12 @@
               </a:lnSpc>
             </a:pPr>
             <a:r>
-              <a:rPr lang="en-GB" sz="2000" i="1" dirty="0" smtClean="0">
+              <a:rPr lang="en-GB" sz="2000" i="1" dirty="0">
                 <a:solidFill>
                   <a:schemeClr val="bg1"/>
                 </a:solidFill>
               </a:rPr>
-              <a:t>New </a:t>
-            </a:r>
-            <a:r>
-              <a:rPr lang="en-GB" sz="2000" i="1" dirty="0">
-                <a:solidFill>
-                  <a:schemeClr val="bg1"/>
-                </a:solidFill>
-              </a:rPr>
-              <a:t>Conservation</a:t>
+              <a:t>New Conservation</a:t>
             </a:r>
           </a:p>
         </p:txBody>
@@ -10176,13 +9275,8 @@
             <a:pPr algn="r"/>
             <a:r>
               <a:rPr lang="en-GB" sz="2000" dirty="0"/>
-              <a:t>Corner </a:t>
-            </a:r>
-            <a:r>
-              <a:rPr lang="en-GB" sz="2000" dirty="0" smtClean="0"/>
-              <a:t>3</a:t>
-            </a:r>
-            <a:endParaRPr lang="en-GB" sz="2000" dirty="0"/>
+              <a:t>Corner 3</a:t>
+            </a:r>
           </a:p>
           <a:p>
             <a:pPr algn="ctr">
@@ -10242,13 +9336,8 @@
           <a:p>
             <a:r>
               <a:rPr lang="en-GB" sz="2000" dirty="0"/>
-              <a:t>Corner </a:t>
-            </a:r>
-            <a:r>
-              <a:rPr lang="en-GB" sz="2000" dirty="0" smtClean="0"/>
-              <a:t>4</a:t>
-            </a:r>
-            <a:endParaRPr lang="en-GB" sz="2000" dirty="0"/>
+              <a:t>Corner 4</a:t>
+            </a:r>
           </a:p>
           <a:p>
             <a:pPr algn="ctr">
@@ -10306,10 +9395,9 @@
           <a:p>
             <a:pPr algn="r"/>
             <a:r>
-              <a:rPr lang="en-GB" sz="2000" dirty="0" smtClean="0"/>
+              <a:rPr lang="en-GB" sz="2000" dirty="0"/>
               <a:t>Corner 2</a:t>
             </a:r>
-            <a:endParaRPr lang="en-GB" sz="2000" dirty="0"/>
           </a:p>
           <a:p>
             <a:pPr algn="ctr">
@@ -10334,13 +9422,6 @@
   <p:clrMapOvr>
     <a:masterClrMapping/>
   </p:clrMapOvr>
-  <p:timing>
-    <p:tnLst>
-      <p:par>
-        <p:cTn id="1" dur="indefinite" restart="never" nodeType="tmRoot"/>
-      </p:par>
-    </p:tnLst>
-  </p:timing>
 </p:sld>
 </file>
 
@@ -10490,11 +9571,7 @@
             </a:pPr>
             <a:r>
               <a:rPr lang="en-GB" sz="2000" dirty="0"/>
-              <a:t>Corner </a:t>
-            </a:r>
-            <a:r>
-              <a:rPr lang="en-GB" sz="2000" dirty="0" smtClean="0"/>
-              <a:t>1</a:t>
+              <a:t>Corner 1</a:t>
             </a:r>
           </a:p>
           <a:p>
@@ -10504,12 +9581,8 @@
               </a:lnSpc>
             </a:pPr>
             <a:r>
-              <a:rPr lang="en-GB" sz="2000" i="1" dirty="0" smtClean="0"/>
-              <a:t>New </a:t>
-            </a:r>
-            <a:r>
               <a:rPr lang="en-GB" sz="2000" i="1" dirty="0"/>
-              <a:t>Conservation</a:t>
+              <a:t>New Conservation</a:t>
             </a:r>
           </a:p>
         </p:txBody>
@@ -10524,13 +9597,6 @@
   <p:clrMapOvr>
     <a:masterClrMapping/>
   </p:clrMapOvr>
-  <p:timing>
-    <p:tnLst>
-      <p:par>
-        <p:cTn id="1" dur="indefinite" restart="never" nodeType="tmRoot"/>
-      </p:par>
-    </p:tnLst>
-  </p:timing>
 </p:sld>
 </file>
 
@@ -10675,10 +9741,9 @@
           <a:p>
             <a:pPr algn="r"/>
             <a:r>
-              <a:rPr lang="en-GB" sz="2000" dirty="0" smtClean="0"/>
+              <a:rPr lang="en-GB" sz="2000" dirty="0"/>
               <a:t>Corner 2</a:t>
             </a:r>
-            <a:endParaRPr lang="en-GB" sz="2000" dirty="0"/>
           </a:p>
           <a:p>
             <a:pPr algn="ctr">
@@ -10703,13 +9768,6 @@
   <p:clrMapOvr>
     <a:masterClrMapping/>
   </p:clrMapOvr>
-  <p:timing>
-    <p:tnLst>
-      <p:par>
-        <p:cTn id="1" dur="indefinite" restart="never" nodeType="tmRoot"/>
-      </p:par>
-    </p:tnLst>
-  </p:timing>
 </p:sld>
 </file>
 

</xml_diff>